<commit_message>
add: Interpreter, Visitor, Command pattern
</commit_message>
<xml_diff>
--- a/StrategyPattern-master/StrategyPattern.pptx
+++ b/StrategyPattern-master/StrategyPattern.pptx
@@ -119,7 +119,18 @@
   </p:defaultTextStyle>
   <p:extLst>
     <p:ext uri="{EFAFB233-063F-42B5-8137-9DF3F51BA10A}">
-      <p15:sldGuideLst xmlns:p15="http://schemas.microsoft.com/office/powerpoint/2012/main" xmlns=""/>
+      <p15:sldGuideLst xmlns:p15="http://schemas.microsoft.com/office/powerpoint/2012/main">
+        <p15:guide id="1" orient="horz" pos="2160">
+          <p15:clr>
+            <a:srgbClr val="A4A3A4"/>
+          </p15:clr>
+        </p15:guide>
+        <p15:guide id="2" pos="3840">
+          <p15:clr>
+            <a:srgbClr val="A4A3A4"/>
+          </p15:clr>
+        </p15:guide>
+      </p15:sldGuideLst>
     </p:ext>
   </p:extLst>
 </p:presentation>
@@ -914,7 +925,7 @@
           <p:cNvPr id="2" name="Title 1">
             <a:extLst>
               <a:ext uri="{FF2B5EF4-FFF2-40B4-BE49-F238E27FC236}">
-                <a16:creationId xmlns:a16="http://schemas.microsoft.com/office/drawing/2014/main" xmlns="" id="{5A4DF23D-7130-F5B6-E12F-64643B4D3F6E}"/>
+                <a16:creationId xmlns:a16="http://schemas.microsoft.com/office/drawing/2014/main" id="{5A4DF23D-7130-F5B6-E12F-64643B4D3F6E}"/>
               </a:ext>
             </a:extLst>
           </p:cNvPr>
@@ -951,7 +962,7 @@
           <p:cNvPr id="3" name="Subtitle 2">
             <a:extLst>
               <a:ext uri="{FF2B5EF4-FFF2-40B4-BE49-F238E27FC236}">
-                <a16:creationId xmlns:a16="http://schemas.microsoft.com/office/drawing/2014/main" xmlns="" id="{EE7E32CF-6E11-29B0-5D43-A927ED6A2B90}"/>
+                <a16:creationId xmlns:a16="http://schemas.microsoft.com/office/drawing/2014/main" id="{EE7E32CF-6E11-29B0-5D43-A927ED6A2B90}"/>
               </a:ext>
             </a:extLst>
           </p:cNvPr>
@@ -1021,7 +1032,7 @@
           <p:cNvPr id="4" name="Date Placeholder 3">
             <a:extLst>
               <a:ext uri="{FF2B5EF4-FFF2-40B4-BE49-F238E27FC236}">
-                <a16:creationId xmlns:a16="http://schemas.microsoft.com/office/drawing/2014/main" xmlns="" id="{8D8577BB-1BBD-4039-0859-DBF4CDCC3FB1}"/>
+                <a16:creationId xmlns:a16="http://schemas.microsoft.com/office/drawing/2014/main" id="{8D8577BB-1BBD-4039-0859-DBF4CDCC3FB1}"/>
               </a:ext>
             </a:extLst>
           </p:cNvPr>
@@ -1039,7 +1050,7 @@
           <a:p>
             <a:fld id="{7D9AC773-A6D0-4233-92AE-DB55DEEF0BF3}" type="datetimeFigureOut">
               <a:rPr lang="en-US" smtClean="0"/>
-              <a:t>5/6/2024</a:t>
+              <a:t>5/7/2024</a:t>
             </a:fld>
             <a:endParaRPr lang="en-US"/>
           </a:p>
@@ -1050,7 +1061,7 @@
           <p:cNvPr id="5" name="Footer Placeholder 4">
             <a:extLst>
               <a:ext uri="{FF2B5EF4-FFF2-40B4-BE49-F238E27FC236}">
-                <a16:creationId xmlns:a16="http://schemas.microsoft.com/office/drawing/2014/main" xmlns="" id="{BC21D4A0-23D1-D050-210B-FD473C919BE7}"/>
+                <a16:creationId xmlns:a16="http://schemas.microsoft.com/office/drawing/2014/main" id="{BC21D4A0-23D1-D050-210B-FD473C919BE7}"/>
               </a:ext>
             </a:extLst>
           </p:cNvPr>
@@ -1075,7 +1086,7 @@
           <p:cNvPr id="6" name="Slide Number Placeholder 5">
             <a:extLst>
               <a:ext uri="{FF2B5EF4-FFF2-40B4-BE49-F238E27FC236}">
-                <a16:creationId xmlns:a16="http://schemas.microsoft.com/office/drawing/2014/main" xmlns="" id="{7C81E67E-2280-2417-BA69-3E73AA775410}"/>
+                <a16:creationId xmlns:a16="http://schemas.microsoft.com/office/drawing/2014/main" id="{7C81E67E-2280-2417-BA69-3E73AA775410}"/>
               </a:ext>
             </a:extLst>
           </p:cNvPr>
@@ -1134,7 +1145,7 @@
           <p:cNvPr id="2" name="Title 1">
             <a:extLst>
               <a:ext uri="{FF2B5EF4-FFF2-40B4-BE49-F238E27FC236}">
-                <a16:creationId xmlns:a16="http://schemas.microsoft.com/office/drawing/2014/main" xmlns="" id="{4AC61A45-B907-B4FC-B11B-7E574A28B4D7}"/>
+                <a16:creationId xmlns:a16="http://schemas.microsoft.com/office/drawing/2014/main" id="{4AC61A45-B907-B4FC-B11B-7E574A28B4D7}"/>
               </a:ext>
             </a:extLst>
           </p:cNvPr>
@@ -1162,7 +1173,7 @@
           <p:cNvPr id="3" name="Vertical Text Placeholder 2">
             <a:extLst>
               <a:ext uri="{FF2B5EF4-FFF2-40B4-BE49-F238E27FC236}">
-                <a16:creationId xmlns:a16="http://schemas.microsoft.com/office/drawing/2014/main" xmlns="" id="{10988288-6F07-D751-E75F-864181ADCD71}"/>
+                <a16:creationId xmlns:a16="http://schemas.microsoft.com/office/drawing/2014/main" id="{10988288-6F07-D751-E75F-864181ADCD71}"/>
               </a:ext>
             </a:extLst>
           </p:cNvPr>
@@ -1219,7 +1230,7 @@
           <p:cNvPr id="4" name="Date Placeholder 3">
             <a:extLst>
               <a:ext uri="{FF2B5EF4-FFF2-40B4-BE49-F238E27FC236}">
-                <a16:creationId xmlns:a16="http://schemas.microsoft.com/office/drawing/2014/main" xmlns="" id="{74B54368-12B0-4E97-FBFB-0E3BFB4569FF}"/>
+                <a16:creationId xmlns:a16="http://schemas.microsoft.com/office/drawing/2014/main" id="{74B54368-12B0-4E97-FBFB-0E3BFB4569FF}"/>
               </a:ext>
             </a:extLst>
           </p:cNvPr>
@@ -1237,7 +1248,7 @@
           <a:p>
             <a:fld id="{7D9AC773-A6D0-4233-92AE-DB55DEEF0BF3}" type="datetimeFigureOut">
               <a:rPr lang="en-US" smtClean="0"/>
-              <a:t>5/6/2024</a:t>
+              <a:t>5/7/2024</a:t>
             </a:fld>
             <a:endParaRPr lang="en-US"/>
           </a:p>
@@ -1248,7 +1259,7 @@
           <p:cNvPr id="5" name="Footer Placeholder 4">
             <a:extLst>
               <a:ext uri="{FF2B5EF4-FFF2-40B4-BE49-F238E27FC236}">
-                <a16:creationId xmlns:a16="http://schemas.microsoft.com/office/drawing/2014/main" xmlns="" id="{4B6DC049-89D2-EFED-3C40-CFE1155C940D}"/>
+                <a16:creationId xmlns:a16="http://schemas.microsoft.com/office/drawing/2014/main" id="{4B6DC049-89D2-EFED-3C40-CFE1155C940D}"/>
               </a:ext>
             </a:extLst>
           </p:cNvPr>
@@ -1273,7 +1284,7 @@
           <p:cNvPr id="6" name="Slide Number Placeholder 5">
             <a:extLst>
               <a:ext uri="{FF2B5EF4-FFF2-40B4-BE49-F238E27FC236}">
-                <a16:creationId xmlns:a16="http://schemas.microsoft.com/office/drawing/2014/main" xmlns="" id="{F585F87E-B9F0-B215-6B78-9429C424551A}"/>
+                <a16:creationId xmlns:a16="http://schemas.microsoft.com/office/drawing/2014/main" id="{F585F87E-B9F0-B215-6B78-9429C424551A}"/>
               </a:ext>
             </a:extLst>
           </p:cNvPr>
@@ -1332,7 +1343,7 @@
           <p:cNvPr id="2" name="Vertical Title 1">
             <a:extLst>
               <a:ext uri="{FF2B5EF4-FFF2-40B4-BE49-F238E27FC236}">
-                <a16:creationId xmlns:a16="http://schemas.microsoft.com/office/drawing/2014/main" xmlns="" id="{161C4DD1-28A9-764A-AC1A-63CDFAF5B47B}"/>
+                <a16:creationId xmlns:a16="http://schemas.microsoft.com/office/drawing/2014/main" id="{161C4DD1-28A9-764A-AC1A-63CDFAF5B47B}"/>
               </a:ext>
             </a:extLst>
           </p:cNvPr>
@@ -1365,7 +1376,7 @@
           <p:cNvPr id="3" name="Vertical Text Placeholder 2">
             <a:extLst>
               <a:ext uri="{FF2B5EF4-FFF2-40B4-BE49-F238E27FC236}">
-                <a16:creationId xmlns:a16="http://schemas.microsoft.com/office/drawing/2014/main" xmlns="" id="{80A19F93-FFEB-5EE8-0A80-1E6FFF339B45}"/>
+                <a16:creationId xmlns:a16="http://schemas.microsoft.com/office/drawing/2014/main" id="{80A19F93-FFEB-5EE8-0A80-1E6FFF339B45}"/>
               </a:ext>
             </a:extLst>
           </p:cNvPr>
@@ -1427,7 +1438,7 @@
           <p:cNvPr id="4" name="Date Placeholder 3">
             <a:extLst>
               <a:ext uri="{FF2B5EF4-FFF2-40B4-BE49-F238E27FC236}">
-                <a16:creationId xmlns:a16="http://schemas.microsoft.com/office/drawing/2014/main" xmlns="" id="{0D49F0A5-22CA-2985-0569-EDFEDB7E9660}"/>
+                <a16:creationId xmlns:a16="http://schemas.microsoft.com/office/drawing/2014/main" id="{0D49F0A5-22CA-2985-0569-EDFEDB7E9660}"/>
               </a:ext>
             </a:extLst>
           </p:cNvPr>
@@ -1445,7 +1456,7 @@
           <a:p>
             <a:fld id="{7D9AC773-A6D0-4233-92AE-DB55DEEF0BF3}" type="datetimeFigureOut">
               <a:rPr lang="en-US" smtClean="0"/>
-              <a:t>5/6/2024</a:t>
+              <a:t>5/7/2024</a:t>
             </a:fld>
             <a:endParaRPr lang="en-US"/>
           </a:p>
@@ -1456,7 +1467,7 @@
           <p:cNvPr id="5" name="Footer Placeholder 4">
             <a:extLst>
               <a:ext uri="{FF2B5EF4-FFF2-40B4-BE49-F238E27FC236}">
-                <a16:creationId xmlns:a16="http://schemas.microsoft.com/office/drawing/2014/main" xmlns="" id="{2FEF4D91-DDF7-BB86-1BA3-C440B9D16DFE}"/>
+                <a16:creationId xmlns:a16="http://schemas.microsoft.com/office/drawing/2014/main" id="{2FEF4D91-DDF7-BB86-1BA3-C440B9D16DFE}"/>
               </a:ext>
             </a:extLst>
           </p:cNvPr>
@@ -1481,7 +1492,7 @@
           <p:cNvPr id="6" name="Slide Number Placeholder 5">
             <a:extLst>
               <a:ext uri="{FF2B5EF4-FFF2-40B4-BE49-F238E27FC236}">
-                <a16:creationId xmlns:a16="http://schemas.microsoft.com/office/drawing/2014/main" xmlns="" id="{EDA1071D-35E3-01C0-76D7-81B60AC47E8B}"/>
+                <a16:creationId xmlns:a16="http://schemas.microsoft.com/office/drawing/2014/main" id="{EDA1071D-35E3-01C0-76D7-81B60AC47E8B}"/>
               </a:ext>
             </a:extLst>
           </p:cNvPr>
@@ -1540,7 +1551,7 @@
           <p:cNvPr id="2" name="Title 1">
             <a:extLst>
               <a:ext uri="{FF2B5EF4-FFF2-40B4-BE49-F238E27FC236}">
-                <a16:creationId xmlns:a16="http://schemas.microsoft.com/office/drawing/2014/main" xmlns="" id="{619165D3-C61B-3F2D-5258-3D0EFA6FD48B}"/>
+                <a16:creationId xmlns:a16="http://schemas.microsoft.com/office/drawing/2014/main" id="{619165D3-C61B-3F2D-5258-3D0EFA6FD48B}"/>
               </a:ext>
             </a:extLst>
           </p:cNvPr>
@@ -1568,7 +1579,7 @@
           <p:cNvPr id="3" name="Content Placeholder 2">
             <a:extLst>
               <a:ext uri="{FF2B5EF4-FFF2-40B4-BE49-F238E27FC236}">
-                <a16:creationId xmlns:a16="http://schemas.microsoft.com/office/drawing/2014/main" xmlns="" id="{6845AA64-5866-CD2E-AD06-A95FA5A90B82}"/>
+                <a16:creationId xmlns:a16="http://schemas.microsoft.com/office/drawing/2014/main" id="{6845AA64-5866-CD2E-AD06-A95FA5A90B82}"/>
               </a:ext>
             </a:extLst>
           </p:cNvPr>
@@ -1625,7 +1636,7 @@
           <p:cNvPr id="4" name="Date Placeholder 3">
             <a:extLst>
               <a:ext uri="{FF2B5EF4-FFF2-40B4-BE49-F238E27FC236}">
-                <a16:creationId xmlns:a16="http://schemas.microsoft.com/office/drawing/2014/main" xmlns="" id="{A533C17A-E40E-F4EB-04D4-7CC6E2A88409}"/>
+                <a16:creationId xmlns:a16="http://schemas.microsoft.com/office/drawing/2014/main" id="{A533C17A-E40E-F4EB-04D4-7CC6E2A88409}"/>
               </a:ext>
             </a:extLst>
           </p:cNvPr>
@@ -1643,7 +1654,7 @@
           <a:p>
             <a:fld id="{7D9AC773-A6D0-4233-92AE-DB55DEEF0BF3}" type="datetimeFigureOut">
               <a:rPr lang="en-US" smtClean="0"/>
-              <a:t>5/6/2024</a:t>
+              <a:t>5/7/2024</a:t>
             </a:fld>
             <a:endParaRPr lang="en-US"/>
           </a:p>
@@ -1654,7 +1665,7 @@
           <p:cNvPr id="5" name="Footer Placeholder 4">
             <a:extLst>
               <a:ext uri="{FF2B5EF4-FFF2-40B4-BE49-F238E27FC236}">
-                <a16:creationId xmlns:a16="http://schemas.microsoft.com/office/drawing/2014/main" xmlns="" id="{21B1592E-C87D-4278-D342-913B9EC6E93D}"/>
+                <a16:creationId xmlns:a16="http://schemas.microsoft.com/office/drawing/2014/main" id="{21B1592E-C87D-4278-D342-913B9EC6E93D}"/>
               </a:ext>
             </a:extLst>
           </p:cNvPr>
@@ -1679,7 +1690,7 @@
           <p:cNvPr id="6" name="Slide Number Placeholder 5">
             <a:extLst>
               <a:ext uri="{FF2B5EF4-FFF2-40B4-BE49-F238E27FC236}">
-                <a16:creationId xmlns:a16="http://schemas.microsoft.com/office/drawing/2014/main" xmlns="" id="{DC697D84-6852-173C-4ADB-252360EB3122}"/>
+                <a16:creationId xmlns:a16="http://schemas.microsoft.com/office/drawing/2014/main" id="{DC697D84-6852-173C-4ADB-252360EB3122}"/>
               </a:ext>
             </a:extLst>
           </p:cNvPr>
@@ -1738,7 +1749,7 @@
           <p:cNvPr id="2" name="Title 1">
             <a:extLst>
               <a:ext uri="{FF2B5EF4-FFF2-40B4-BE49-F238E27FC236}">
-                <a16:creationId xmlns:a16="http://schemas.microsoft.com/office/drawing/2014/main" xmlns="" id="{95A6F688-B599-7CE4-2A71-63A2585A1E09}"/>
+                <a16:creationId xmlns:a16="http://schemas.microsoft.com/office/drawing/2014/main" id="{95A6F688-B599-7CE4-2A71-63A2585A1E09}"/>
               </a:ext>
             </a:extLst>
           </p:cNvPr>
@@ -1775,7 +1786,7 @@
           <p:cNvPr id="3" name="Text Placeholder 2">
             <a:extLst>
               <a:ext uri="{FF2B5EF4-FFF2-40B4-BE49-F238E27FC236}">
-                <a16:creationId xmlns:a16="http://schemas.microsoft.com/office/drawing/2014/main" xmlns="" id="{0CFD2AC5-3B35-1E15-8869-2C3EB6996A5E}"/>
+                <a16:creationId xmlns:a16="http://schemas.microsoft.com/office/drawing/2014/main" id="{0CFD2AC5-3B35-1E15-8869-2C3EB6996A5E}"/>
               </a:ext>
             </a:extLst>
           </p:cNvPr>
@@ -1900,7 +1911,7 @@
           <p:cNvPr id="4" name="Date Placeholder 3">
             <a:extLst>
               <a:ext uri="{FF2B5EF4-FFF2-40B4-BE49-F238E27FC236}">
-                <a16:creationId xmlns:a16="http://schemas.microsoft.com/office/drawing/2014/main" xmlns="" id="{3AFDF5FD-128D-9283-F35B-0CD0F6B029CA}"/>
+                <a16:creationId xmlns:a16="http://schemas.microsoft.com/office/drawing/2014/main" id="{3AFDF5FD-128D-9283-F35B-0CD0F6B029CA}"/>
               </a:ext>
             </a:extLst>
           </p:cNvPr>
@@ -1918,7 +1929,7 @@
           <a:p>
             <a:fld id="{7D9AC773-A6D0-4233-92AE-DB55DEEF0BF3}" type="datetimeFigureOut">
               <a:rPr lang="en-US" smtClean="0"/>
-              <a:t>5/6/2024</a:t>
+              <a:t>5/7/2024</a:t>
             </a:fld>
             <a:endParaRPr lang="en-US"/>
           </a:p>
@@ -1929,7 +1940,7 @@
           <p:cNvPr id="5" name="Footer Placeholder 4">
             <a:extLst>
               <a:ext uri="{FF2B5EF4-FFF2-40B4-BE49-F238E27FC236}">
-                <a16:creationId xmlns:a16="http://schemas.microsoft.com/office/drawing/2014/main" xmlns="" id="{DBF4D383-2306-0227-F821-5C7A468DF572}"/>
+                <a16:creationId xmlns:a16="http://schemas.microsoft.com/office/drawing/2014/main" id="{DBF4D383-2306-0227-F821-5C7A468DF572}"/>
               </a:ext>
             </a:extLst>
           </p:cNvPr>
@@ -1954,7 +1965,7 @@
           <p:cNvPr id="6" name="Slide Number Placeholder 5">
             <a:extLst>
               <a:ext uri="{FF2B5EF4-FFF2-40B4-BE49-F238E27FC236}">
-                <a16:creationId xmlns:a16="http://schemas.microsoft.com/office/drawing/2014/main" xmlns="" id="{A809EC54-E4A0-0F4F-107C-8B923FA51D94}"/>
+                <a16:creationId xmlns:a16="http://schemas.microsoft.com/office/drawing/2014/main" id="{A809EC54-E4A0-0F4F-107C-8B923FA51D94}"/>
               </a:ext>
             </a:extLst>
           </p:cNvPr>
@@ -2013,7 +2024,7 @@
           <p:cNvPr id="2" name="Title 1">
             <a:extLst>
               <a:ext uri="{FF2B5EF4-FFF2-40B4-BE49-F238E27FC236}">
-                <a16:creationId xmlns:a16="http://schemas.microsoft.com/office/drawing/2014/main" xmlns="" id="{EA2430FA-6F8A-3896-8817-B1FB7D919A25}"/>
+                <a16:creationId xmlns:a16="http://schemas.microsoft.com/office/drawing/2014/main" id="{EA2430FA-6F8A-3896-8817-B1FB7D919A25}"/>
               </a:ext>
             </a:extLst>
           </p:cNvPr>
@@ -2041,7 +2052,7 @@
           <p:cNvPr id="3" name="Content Placeholder 2">
             <a:extLst>
               <a:ext uri="{FF2B5EF4-FFF2-40B4-BE49-F238E27FC236}">
-                <a16:creationId xmlns:a16="http://schemas.microsoft.com/office/drawing/2014/main" xmlns="" id="{AC117FC3-7B70-808F-7E4D-37471343C078}"/>
+                <a16:creationId xmlns:a16="http://schemas.microsoft.com/office/drawing/2014/main" id="{AC117FC3-7B70-808F-7E4D-37471343C078}"/>
               </a:ext>
             </a:extLst>
           </p:cNvPr>
@@ -2103,7 +2114,7 @@
           <p:cNvPr id="4" name="Content Placeholder 3">
             <a:extLst>
               <a:ext uri="{FF2B5EF4-FFF2-40B4-BE49-F238E27FC236}">
-                <a16:creationId xmlns:a16="http://schemas.microsoft.com/office/drawing/2014/main" xmlns="" id="{502BBB9F-EB1D-BCCE-7C11-D77D82E26FF8}"/>
+                <a16:creationId xmlns:a16="http://schemas.microsoft.com/office/drawing/2014/main" id="{502BBB9F-EB1D-BCCE-7C11-D77D82E26FF8}"/>
               </a:ext>
             </a:extLst>
           </p:cNvPr>
@@ -2165,7 +2176,7 @@
           <p:cNvPr id="5" name="Date Placeholder 4">
             <a:extLst>
               <a:ext uri="{FF2B5EF4-FFF2-40B4-BE49-F238E27FC236}">
-                <a16:creationId xmlns:a16="http://schemas.microsoft.com/office/drawing/2014/main" xmlns="" id="{C5CB003B-7D34-C0A3-BCC8-C4C3C31AD8C1}"/>
+                <a16:creationId xmlns:a16="http://schemas.microsoft.com/office/drawing/2014/main" id="{C5CB003B-7D34-C0A3-BCC8-C4C3C31AD8C1}"/>
               </a:ext>
             </a:extLst>
           </p:cNvPr>
@@ -2183,7 +2194,7 @@
           <a:p>
             <a:fld id="{7D9AC773-A6D0-4233-92AE-DB55DEEF0BF3}" type="datetimeFigureOut">
               <a:rPr lang="en-US" smtClean="0"/>
-              <a:t>5/6/2024</a:t>
+              <a:t>5/7/2024</a:t>
             </a:fld>
             <a:endParaRPr lang="en-US"/>
           </a:p>
@@ -2194,7 +2205,7 @@
           <p:cNvPr id="6" name="Footer Placeholder 5">
             <a:extLst>
               <a:ext uri="{FF2B5EF4-FFF2-40B4-BE49-F238E27FC236}">
-                <a16:creationId xmlns:a16="http://schemas.microsoft.com/office/drawing/2014/main" xmlns="" id="{B36FC42C-CCE8-6F78-09F8-9BC138FFFAAE}"/>
+                <a16:creationId xmlns:a16="http://schemas.microsoft.com/office/drawing/2014/main" id="{B36FC42C-CCE8-6F78-09F8-9BC138FFFAAE}"/>
               </a:ext>
             </a:extLst>
           </p:cNvPr>
@@ -2219,7 +2230,7 @@
           <p:cNvPr id="7" name="Slide Number Placeholder 6">
             <a:extLst>
               <a:ext uri="{FF2B5EF4-FFF2-40B4-BE49-F238E27FC236}">
-                <a16:creationId xmlns:a16="http://schemas.microsoft.com/office/drawing/2014/main" xmlns="" id="{90EC4F29-8370-8402-0FF8-5526633BDB78}"/>
+                <a16:creationId xmlns:a16="http://schemas.microsoft.com/office/drawing/2014/main" id="{90EC4F29-8370-8402-0FF8-5526633BDB78}"/>
               </a:ext>
             </a:extLst>
           </p:cNvPr>
@@ -2278,7 +2289,7 @@
           <p:cNvPr id="2" name="Title 1">
             <a:extLst>
               <a:ext uri="{FF2B5EF4-FFF2-40B4-BE49-F238E27FC236}">
-                <a16:creationId xmlns:a16="http://schemas.microsoft.com/office/drawing/2014/main" xmlns="" id="{218B1B56-608F-65B6-14B2-D53D6A908486}"/>
+                <a16:creationId xmlns:a16="http://schemas.microsoft.com/office/drawing/2014/main" id="{218B1B56-608F-65B6-14B2-D53D6A908486}"/>
               </a:ext>
             </a:extLst>
           </p:cNvPr>
@@ -2311,7 +2322,7 @@
           <p:cNvPr id="3" name="Text Placeholder 2">
             <a:extLst>
               <a:ext uri="{FF2B5EF4-FFF2-40B4-BE49-F238E27FC236}">
-                <a16:creationId xmlns:a16="http://schemas.microsoft.com/office/drawing/2014/main" xmlns="" id="{955888EF-A7C0-A4C0-D4DB-F4A8931406BC}"/>
+                <a16:creationId xmlns:a16="http://schemas.microsoft.com/office/drawing/2014/main" id="{955888EF-A7C0-A4C0-D4DB-F4A8931406BC}"/>
               </a:ext>
             </a:extLst>
           </p:cNvPr>
@@ -2382,7 +2393,7 @@
           <p:cNvPr id="4" name="Content Placeholder 3">
             <a:extLst>
               <a:ext uri="{FF2B5EF4-FFF2-40B4-BE49-F238E27FC236}">
-                <a16:creationId xmlns:a16="http://schemas.microsoft.com/office/drawing/2014/main" xmlns="" id="{96A7048D-113B-A122-0061-795BEBA1EF5A}"/>
+                <a16:creationId xmlns:a16="http://schemas.microsoft.com/office/drawing/2014/main" id="{96A7048D-113B-A122-0061-795BEBA1EF5A}"/>
               </a:ext>
             </a:extLst>
           </p:cNvPr>
@@ -2444,7 +2455,7 @@
           <p:cNvPr id="5" name="Text Placeholder 4">
             <a:extLst>
               <a:ext uri="{FF2B5EF4-FFF2-40B4-BE49-F238E27FC236}">
-                <a16:creationId xmlns:a16="http://schemas.microsoft.com/office/drawing/2014/main" xmlns="" id="{8C44BB1F-EC73-4327-B09D-AC6EC6970264}"/>
+                <a16:creationId xmlns:a16="http://schemas.microsoft.com/office/drawing/2014/main" id="{8C44BB1F-EC73-4327-B09D-AC6EC6970264}"/>
               </a:ext>
             </a:extLst>
           </p:cNvPr>
@@ -2515,7 +2526,7 @@
           <p:cNvPr id="6" name="Content Placeholder 5">
             <a:extLst>
               <a:ext uri="{FF2B5EF4-FFF2-40B4-BE49-F238E27FC236}">
-                <a16:creationId xmlns:a16="http://schemas.microsoft.com/office/drawing/2014/main" xmlns="" id="{08DB5BCD-EA8E-8311-C995-3E86BD0DAECA}"/>
+                <a16:creationId xmlns:a16="http://schemas.microsoft.com/office/drawing/2014/main" id="{08DB5BCD-EA8E-8311-C995-3E86BD0DAECA}"/>
               </a:ext>
             </a:extLst>
           </p:cNvPr>
@@ -2577,7 +2588,7 @@
           <p:cNvPr id="7" name="Date Placeholder 6">
             <a:extLst>
               <a:ext uri="{FF2B5EF4-FFF2-40B4-BE49-F238E27FC236}">
-                <a16:creationId xmlns:a16="http://schemas.microsoft.com/office/drawing/2014/main" xmlns="" id="{7583B70F-6E34-0AD4-C237-1005ED2BD03D}"/>
+                <a16:creationId xmlns:a16="http://schemas.microsoft.com/office/drawing/2014/main" id="{7583B70F-6E34-0AD4-C237-1005ED2BD03D}"/>
               </a:ext>
             </a:extLst>
           </p:cNvPr>
@@ -2595,7 +2606,7 @@
           <a:p>
             <a:fld id="{7D9AC773-A6D0-4233-92AE-DB55DEEF0BF3}" type="datetimeFigureOut">
               <a:rPr lang="en-US" smtClean="0"/>
-              <a:t>5/6/2024</a:t>
+              <a:t>5/7/2024</a:t>
             </a:fld>
             <a:endParaRPr lang="en-US"/>
           </a:p>
@@ -2606,7 +2617,7 @@
           <p:cNvPr id="8" name="Footer Placeholder 7">
             <a:extLst>
               <a:ext uri="{FF2B5EF4-FFF2-40B4-BE49-F238E27FC236}">
-                <a16:creationId xmlns:a16="http://schemas.microsoft.com/office/drawing/2014/main" xmlns="" id="{1FD860BE-5C6F-0E96-D5E9-D76A9F34B311}"/>
+                <a16:creationId xmlns:a16="http://schemas.microsoft.com/office/drawing/2014/main" id="{1FD860BE-5C6F-0E96-D5E9-D76A9F34B311}"/>
               </a:ext>
             </a:extLst>
           </p:cNvPr>
@@ -2631,7 +2642,7 @@
           <p:cNvPr id="9" name="Slide Number Placeholder 8">
             <a:extLst>
               <a:ext uri="{FF2B5EF4-FFF2-40B4-BE49-F238E27FC236}">
-                <a16:creationId xmlns:a16="http://schemas.microsoft.com/office/drawing/2014/main" xmlns="" id="{00E0950D-AC56-943D-2B43-4CA97385E8F6}"/>
+                <a16:creationId xmlns:a16="http://schemas.microsoft.com/office/drawing/2014/main" id="{00E0950D-AC56-943D-2B43-4CA97385E8F6}"/>
               </a:ext>
             </a:extLst>
           </p:cNvPr>
@@ -2690,7 +2701,7 @@
           <p:cNvPr id="2" name="Title 1">
             <a:extLst>
               <a:ext uri="{FF2B5EF4-FFF2-40B4-BE49-F238E27FC236}">
-                <a16:creationId xmlns:a16="http://schemas.microsoft.com/office/drawing/2014/main" xmlns="" id="{9C2910F9-5F7A-D9EE-226E-722754E75DB6}"/>
+                <a16:creationId xmlns:a16="http://schemas.microsoft.com/office/drawing/2014/main" id="{9C2910F9-5F7A-D9EE-226E-722754E75DB6}"/>
               </a:ext>
             </a:extLst>
           </p:cNvPr>
@@ -2718,7 +2729,7 @@
           <p:cNvPr id="3" name="Date Placeholder 2">
             <a:extLst>
               <a:ext uri="{FF2B5EF4-FFF2-40B4-BE49-F238E27FC236}">
-                <a16:creationId xmlns:a16="http://schemas.microsoft.com/office/drawing/2014/main" xmlns="" id="{68F0B238-A3D1-C33F-2E30-9FBFFF40E478}"/>
+                <a16:creationId xmlns:a16="http://schemas.microsoft.com/office/drawing/2014/main" id="{68F0B238-A3D1-C33F-2E30-9FBFFF40E478}"/>
               </a:ext>
             </a:extLst>
           </p:cNvPr>
@@ -2736,7 +2747,7 @@
           <a:p>
             <a:fld id="{7D9AC773-A6D0-4233-92AE-DB55DEEF0BF3}" type="datetimeFigureOut">
               <a:rPr lang="en-US" smtClean="0"/>
-              <a:t>5/6/2024</a:t>
+              <a:t>5/7/2024</a:t>
             </a:fld>
             <a:endParaRPr lang="en-US"/>
           </a:p>
@@ -2747,7 +2758,7 @@
           <p:cNvPr id="4" name="Footer Placeholder 3">
             <a:extLst>
               <a:ext uri="{FF2B5EF4-FFF2-40B4-BE49-F238E27FC236}">
-                <a16:creationId xmlns:a16="http://schemas.microsoft.com/office/drawing/2014/main" xmlns="" id="{7623566A-5AFE-2735-6B3C-36A0E7569319}"/>
+                <a16:creationId xmlns:a16="http://schemas.microsoft.com/office/drawing/2014/main" id="{7623566A-5AFE-2735-6B3C-36A0E7569319}"/>
               </a:ext>
             </a:extLst>
           </p:cNvPr>
@@ -2772,7 +2783,7 @@
           <p:cNvPr id="5" name="Slide Number Placeholder 4">
             <a:extLst>
               <a:ext uri="{FF2B5EF4-FFF2-40B4-BE49-F238E27FC236}">
-                <a16:creationId xmlns:a16="http://schemas.microsoft.com/office/drawing/2014/main" xmlns="" id="{165587EF-7797-FF4B-C27E-B008D6532943}"/>
+                <a16:creationId xmlns:a16="http://schemas.microsoft.com/office/drawing/2014/main" id="{165587EF-7797-FF4B-C27E-B008D6532943}"/>
               </a:ext>
             </a:extLst>
           </p:cNvPr>
@@ -2831,7 +2842,7 @@
           <p:cNvPr id="2" name="Date Placeholder 1">
             <a:extLst>
               <a:ext uri="{FF2B5EF4-FFF2-40B4-BE49-F238E27FC236}">
-                <a16:creationId xmlns:a16="http://schemas.microsoft.com/office/drawing/2014/main" xmlns="" id="{B3F85C8D-B84D-8F50-8239-92424F121F71}"/>
+                <a16:creationId xmlns:a16="http://schemas.microsoft.com/office/drawing/2014/main" id="{B3F85C8D-B84D-8F50-8239-92424F121F71}"/>
               </a:ext>
             </a:extLst>
           </p:cNvPr>
@@ -2849,7 +2860,7 @@
           <a:p>
             <a:fld id="{7D9AC773-A6D0-4233-92AE-DB55DEEF0BF3}" type="datetimeFigureOut">
               <a:rPr lang="en-US" smtClean="0"/>
-              <a:t>5/6/2024</a:t>
+              <a:t>5/7/2024</a:t>
             </a:fld>
             <a:endParaRPr lang="en-US"/>
           </a:p>
@@ -2860,7 +2871,7 @@
           <p:cNvPr id="3" name="Footer Placeholder 2">
             <a:extLst>
               <a:ext uri="{FF2B5EF4-FFF2-40B4-BE49-F238E27FC236}">
-                <a16:creationId xmlns:a16="http://schemas.microsoft.com/office/drawing/2014/main" xmlns="" id="{F27E4883-7AD6-4E45-D6BA-4445F241AD19}"/>
+                <a16:creationId xmlns:a16="http://schemas.microsoft.com/office/drawing/2014/main" id="{F27E4883-7AD6-4E45-D6BA-4445F241AD19}"/>
               </a:ext>
             </a:extLst>
           </p:cNvPr>
@@ -2885,7 +2896,7 @@
           <p:cNvPr id="4" name="Slide Number Placeholder 3">
             <a:extLst>
               <a:ext uri="{FF2B5EF4-FFF2-40B4-BE49-F238E27FC236}">
-                <a16:creationId xmlns:a16="http://schemas.microsoft.com/office/drawing/2014/main" xmlns="" id="{00DC43B1-B714-93AC-5793-CFE4195B1331}"/>
+                <a16:creationId xmlns:a16="http://schemas.microsoft.com/office/drawing/2014/main" id="{00DC43B1-B714-93AC-5793-CFE4195B1331}"/>
               </a:ext>
             </a:extLst>
           </p:cNvPr>
@@ -2944,7 +2955,7 @@
           <p:cNvPr id="2" name="Title 1">
             <a:extLst>
               <a:ext uri="{FF2B5EF4-FFF2-40B4-BE49-F238E27FC236}">
-                <a16:creationId xmlns:a16="http://schemas.microsoft.com/office/drawing/2014/main" xmlns="" id="{E4B5A340-A00F-B510-BA2E-6D43277ADB90}"/>
+                <a16:creationId xmlns:a16="http://schemas.microsoft.com/office/drawing/2014/main" id="{E4B5A340-A00F-B510-BA2E-6D43277ADB90}"/>
               </a:ext>
             </a:extLst>
           </p:cNvPr>
@@ -2981,7 +2992,7 @@
           <p:cNvPr id="3" name="Content Placeholder 2">
             <a:extLst>
               <a:ext uri="{FF2B5EF4-FFF2-40B4-BE49-F238E27FC236}">
-                <a16:creationId xmlns:a16="http://schemas.microsoft.com/office/drawing/2014/main" xmlns="" id="{A3C6F380-7907-BC6B-D53D-007C6A6C569A}"/>
+                <a16:creationId xmlns:a16="http://schemas.microsoft.com/office/drawing/2014/main" id="{A3C6F380-7907-BC6B-D53D-007C6A6C569A}"/>
               </a:ext>
             </a:extLst>
           </p:cNvPr>
@@ -3071,7 +3082,7 @@
           <p:cNvPr id="4" name="Text Placeholder 3">
             <a:extLst>
               <a:ext uri="{FF2B5EF4-FFF2-40B4-BE49-F238E27FC236}">
-                <a16:creationId xmlns:a16="http://schemas.microsoft.com/office/drawing/2014/main" xmlns="" id="{172DFC41-F064-4AC8-28AA-C20D75AF6EE9}"/>
+                <a16:creationId xmlns:a16="http://schemas.microsoft.com/office/drawing/2014/main" id="{172DFC41-F064-4AC8-28AA-C20D75AF6EE9}"/>
               </a:ext>
             </a:extLst>
           </p:cNvPr>
@@ -3142,7 +3153,7 @@
           <p:cNvPr id="5" name="Date Placeholder 4">
             <a:extLst>
               <a:ext uri="{FF2B5EF4-FFF2-40B4-BE49-F238E27FC236}">
-                <a16:creationId xmlns:a16="http://schemas.microsoft.com/office/drawing/2014/main" xmlns="" id="{F67B62E4-ECAD-34D6-FE12-2FD9D8443B46}"/>
+                <a16:creationId xmlns:a16="http://schemas.microsoft.com/office/drawing/2014/main" id="{F67B62E4-ECAD-34D6-FE12-2FD9D8443B46}"/>
               </a:ext>
             </a:extLst>
           </p:cNvPr>
@@ -3160,7 +3171,7 @@
           <a:p>
             <a:fld id="{7D9AC773-A6D0-4233-92AE-DB55DEEF0BF3}" type="datetimeFigureOut">
               <a:rPr lang="en-US" smtClean="0"/>
-              <a:t>5/6/2024</a:t>
+              <a:t>5/7/2024</a:t>
             </a:fld>
             <a:endParaRPr lang="en-US"/>
           </a:p>
@@ -3171,7 +3182,7 @@
           <p:cNvPr id="6" name="Footer Placeholder 5">
             <a:extLst>
               <a:ext uri="{FF2B5EF4-FFF2-40B4-BE49-F238E27FC236}">
-                <a16:creationId xmlns:a16="http://schemas.microsoft.com/office/drawing/2014/main" xmlns="" id="{F2BA8F89-FBE1-6896-BE58-5659B137149A}"/>
+                <a16:creationId xmlns:a16="http://schemas.microsoft.com/office/drawing/2014/main" id="{F2BA8F89-FBE1-6896-BE58-5659B137149A}"/>
               </a:ext>
             </a:extLst>
           </p:cNvPr>
@@ -3196,7 +3207,7 @@
           <p:cNvPr id="7" name="Slide Number Placeholder 6">
             <a:extLst>
               <a:ext uri="{FF2B5EF4-FFF2-40B4-BE49-F238E27FC236}">
-                <a16:creationId xmlns:a16="http://schemas.microsoft.com/office/drawing/2014/main" xmlns="" id="{ECBB4F38-1FF8-7D96-0120-1E6CB6E98601}"/>
+                <a16:creationId xmlns:a16="http://schemas.microsoft.com/office/drawing/2014/main" id="{ECBB4F38-1FF8-7D96-0120-1E6CB6E98601}"/>
               </a:ext>
             </a:extLst>
           </p:cNvPr>
@@ -3255,7 +3266,7 @@
           <p:cNvPr id="2" name="Title 1">
             <a:extLst>
               <a:ext uri="{FF2B5EF4-FFF2-40B4-BE49-F238E27FC236}">
-                <a16:creationId xmlns:a16="http://schemas.microsoft.com/office/drawing/2014/main" xmlns="" id="{C110599F-8B72-0DD5-1A89-3E3D71723A2C}"/>
+                <a16:creationId xmlns:a16="http://schemas.microsoft.com/office/drawing/2014/main" id="{C110599F-8B72-0DD5-1A89-3E3D71723A2C}"/>
               </a:ext>
             </a:extLst>
           </p:cNvPr>
@@ -3292,7 +3303,7 @@
           <p:cNvPr id="3" name="Picture Placeholder 2">
             <a:extLst>
               <a:ext uri="{FF2B5EF4-FFF2-40B4-BE49-F238E27FC236}">
-                <a16:creationId xmlns:a16="http://schemas.microsoft.com/office/drawing/2014/main" xmlns="" id="{CA065E44-2F0F-14F4-BA79-C85769589EA3}"/>
+                <a16:creationId xmlns:a16="http://schemas.microsoft.com/office/drawing/2014/main" id="{CA065E44-2F0F-14F4-BA79-C85769589EA3}"/>
               </a:ext>
             </a:extLst>
           </p:cNvPr>
@@ -3359,7 +3370,7 @@
           <p:cNvPr id="4" name="Text Placeholder 3">
             <a:extLst>
               <a:ext uri="{FF2B5EF4-FFF2-40B4-BE49-F238E27FC236}">
-                <a16:creationId xmlns:a16="http://schemas.microsoft.com/office/drawing/2014/main" xmlns="" id="{CB9197B7-9CDD-F3C3-99FB-657D989FC6D1}"/>
+                <a16:creationId xmlns:a16="http://schemas.microsoft.com/office/drawing/2014/main" id="{CB9197B7-9CDD-F3C3-99FB-657D989FC6D1}"/>
               </a:ext>
             </a:extLst>
           </p:cNvPr>
@@ -3430,7 +3441,7 @@
           <p:cNvPr id="5" name="Date Placeholder 4">
             <a:extLst>
               <a:ext uri="{FF2B5EF4-FFF2-40B4-BE49-F238E27FC236}">
-                <a16:creationId xmlns:a16="http://schemas.microsoft.com/office/drawing/2014/main" xmlns="" id="{83FF17D6-5903-8E59-3A8C-99BFF26F34F4}"/>
+                <a16:creationId xmlns:a16="http://schemas.microsoft.com/office/drawing/2014/main" id="{83FF17D6-5903-8E59-3A8C-99BFF26F34F4}"/>
               </a:ext>
             </a:extLst>
           </p:cNvPr>
@@ -3448,7 +3459,7 @@
           <a:p>
             <a:fld id="{7D9AC773-A6D0-4233-92AE-DB55DEEF0BF3}" type="datetimeFigureOut">
               <a:rPr lang="en-US" smtClean="0"/>
-              <a:t>5/6/2024</a:t>
+              <a:t>5/7/2024</a:t>
             </a:fld>
             <a:endParaRPr lang="en-US"/>
           </a:p>
@@ -3459,7 +3470,7 @@
           <p:cNvPr id="6" name="Footer Placeholder 5">
             <a:extLst>
               <a:ext uri="{FF2B5EF4-FFF2-40B4-BE49-F238E27FC236}">
-                <a16:creationId xmlns:a16="http://schemas.microsoft.com/office/drawing/2014/main" xmlns="" id="{17B3930A-6FC2-E64D-BF37-C522980EB702}"/>
+                <a16:creationId xmlns:a16="http://schemas.microsoft.com/office/drawing/2014/main" id="{17B3930A-6FC2-E64D-BF37-C522980EB702}"/>
               </a:ext>
             </a:extLst>
           </p:cNvPr>
@@ -3484,7 +3495,7 @@
           <p:cNvPr id="7" name="Slide Number Placeholder 6">
             <a:extLst>
               <a:ext uri="{FF2B5EF4-FFF2-40B4-BE49-F238E27FC236}">
-                <a16:creationId xmlns:a16="http://schemas.microsoft.com/office/drawing/2014/main" xmlns="" id="{FC73821B-9A0F-CD20-4958-57BE7B22615E}"/>
+                <a16:creationId xmlns:a16="http://schemas.microsoft.com/office/drawing/2014/main" id="{FC73821B-9A0F-CD20-4958-57BE7B22615E}"/>
               </a:ext>
             </a:extLst>
           </p:cNvPr>
@@ -3548,7 +3559,7 @@
           <p:cNvPr id="2" name="Title Placeholder 1">
             <a:extLst>
               <a:ext uri="{FF2B5EF4-FFF2-40B4-BE49-F238E27FC236}">
-                <a16:creationId xmlns:a16="http://schemas.microsoft.com/office/drawing/2014/main" xmlns="" id="{75B82DBD-37CA-96A5-9A38-14005E87A56E}"/>
+                <a16:creationId xmlns:a16="http://schemas.microsoft.com/office/drawing/2014/main" id="{75B82DBD-37CA-96A5-9A38-14005E87A56E}"/>
               </a:ext>
             </a:extLst>
           </p:cNvPr>
@@ -3586,7 +3597,7 @@
           <p:cNvPr id="3" name="Text Placeholder 2">
             <a:extLst>
               <a:ext uri="{FF2B5EF4-FFF2-40B4-BE49-F238E27FC236}">
-                <a16:creationId xmlns:a16="http://schemas.microsoft.com/office/drawing/2014/main" xmlns="" id="{464DDC89-587A-2B79-1938-C36203D85C52}"/>
+                <a16:creationId xmlns:a16="http://schemas.microsoft.com/office/drawing/2014/main" id="{464DDC89-587A-2B79-1938-C36203D85C52}"/>
               </a:ext>
             </a:extLst>
           </p:cNvPr>
@@ -3653,7 +3664,7 @@
           <p:cNvPr id="4" name="Date Placeholder 3">
             <a:extLst>
               <a:ext uri="{FF2B5EF4-FFF2-40B4-BE49-F238E27FC236}">
-                <a16:creationId xmlns:a16="http://schemas.microsoft.com/office/drawing/2014/main" xmlns="" id="{CFF03FBE-3AF4-4987-48FD-3D7BF90D3C81}"/>
+                <a16:creationId xmlns:a16="http://schemas.microsoft.com/office/drawing/2014/main" id="{CFF03FBE-3AF4-4987-48FD-3D7BF90D3C81}"/>
               </a:ext>
             </a:extLst>
           </p:cNvPr>
@@ -3689,7 +3700,7 @@
           <a:p>
             <a:fld id="{7D9AC773-A6D0-4233-92AE-DB55DEEF0BF3}" type="datetimeFigureOut">
               <a:rPr lang="en-US" smtClean="0"/>
-              <a:t>5/6/2024</a:t>
+              <a:t>5/7/2024</a:t>
             </a:fld>
             <a:endParaRPr lang="en-US"/>
           </a:p>
@@ -3700,7 +3711,7 @@
           <p:cNvPr id="5" name="Footer Placeholder 4">
             <a:extLst>
               <a:ext uri="{FF2B5EF4-FFF2-40B4-BE49-F238E27FC236}">
-                <a16:creationId xmlns:a16="http://schemas.microsoft.com/office/drawing/2014/main" xmlns="" id="{47BB671D-E0DF-1A01-DDBA-0DDF5FCCAA0E}"/>
+                <a16:creationId xmlns:a16="http://schemas.microsoft.com/office/drawing/2014/main" id="{47BB671D-E0DF-1A01-DDBA-0DDF5FCCAA0E}"/>
               </a:ext>
             </a:extLst>
           </p:cNvPr>
@@ -3743,7 +3754,7 @@
           <p:cNvPr id="6" name="Slide Number Placeholder 5">
             <a:extLst>
               <a:ext uri="{FF2B5EF4-FFF2-40B4-BE49-F238E27FC236}">
-                <a16:creationId xmlns:a16="http://schemas.microsoft.com/office/drawing/2014/main" xmlns="" id="{C734BD4D-5E91-A498-2C2D-E416724CE05C}"/>
+                <a16:creationId xmlns:a16="http://schemas.microsoft.com/office/drawing/2014/main" id="{C734BD4D-5E91-A498-2C2D-E416724CE05C}"/>
               </a:ext>
             </a:extLst>
           </p:cNvPr>
@@ -4111,7 +4122,7 @@
           <p:cNvPr id="2" name="Title 1">
             <a:extLst>
               <a:ext uri="{FF2B5EF4-FFF2-40B4-BE49-F238E27FC236}">
-                <a16:creationId xmlns:a16="http://schemas.microsoft.com/office/drawing/2014/main" xmlns="" id="{D1A0CDEC-3C9C-36DC-93F7-715D6C4FFE18}"/>
+                <a16:creationId xmlns:a16="http://schemas.microsoft.com/office/drawing/2014/main" id="{D1A0CDEC-3C9C-36DC-93F7-715D6C4FFE18}"/>
               </a:ext>
             </a:extLst>
           </p:cNvPr>
@@ -4142,7 +4153,7 @@
               <a:rPr lang="en-US" b="1" dirty="0"/>
             </a:br>
             <a:r>
-              <a:rPr lang="en-US" b="1" dirty="0" smtClean="0"/>
+              <a:rPr lang="en-US" b="1" dirty="0"/>
               <a:t>Pattern</a:t>
             </a:r>
             <a:endParaRPr lang="en-US" dirty="0"/>
@@ -4154,7 +4165,7 @@
           <p:cNvPr id="3" name="Subtitle 2">
             <a:extLst>
               <a:ext uri="{FF2B5EF4-FFF2-40B4-BE49-F238E27FC236}">
-                <a16:creationId xmlns:a16="http://schemas.microsoft.com/office/drawing/2014/main" xmlns="" id="{D36EF124-9F22-0A10-C295-AE60AFA42984}"/>
+                <a16:creationId xmlns:a16="http://schemas.microsoft.com/office/drawing/2014/main" id="{D36EF124-9F22-0A10-C295-AE60AFA42984}"/>
               </a:ext>
             </a:extLst>
           </p:cNvPr>
@@ -4178,10 +4189,9 @@
           <a:lstStyle/>
           <a:p>
             <a:r>
-              <a:rPr lang="en-US" sz="2800" dirty="0" smtClean="0"/>
+              <a:rPr lang="en-US" sz="2800" dirty="0"/>
               <a:t>Group 7</a:t>
             </a:r>
-            <a:endParaRPr lang="en-US" sz="2800" dirty="0"/>
           </a:p>
         </p:txBody>
       </p:sp>
@@ -4195,13 +4205,6 @@
   <p:clrMapOvr>
     <a:masterClrMapping/>
   </p:clrMapOvr>
-  <p:timing>
-    <p:tnLst>
-      <p:par>
-        <p:cTn id="1" dur="indefinite" restart="never" nodeType="tmRoot"/>
-      </p:par>
-    </p:tnLst>
-  </p:timing>
 </p:sld>
 </file>
 
@@ -4213,7 +4216,7 @@
         <p:cNvPr id="1" name="">
           <a:extLst>
             <a:ext uri="{FF2B5EF4-FFF2-40B4-BE49-F238E27FC236}">
-              <a16:creationId xmlns:a16="http://schemas.microsoft.com/office/drawing/2014/main" xmlns="" id="{F6D8DEF9-D22C-3F38-7DB2-4A2E1A6A4F73}"/>
+              <a16:creationId xmlns:a16="http://schemas.microsoft.com/office/drawing/2014/main" id="{F6D8DEF9-D22C-3F38-7DB2-4A2E1A6A4F73}"/>
             </a:ext>
           </a:extLst>
         </p:cNvPr>
@@ -4233,7 +4236,7 @@
           <p:cNvPr id="2" name="Title 1">
             <a:extLst>
               <a:ext uri="{FF2B5EF4-FFF2-40B4-BE49-F238E27FC236}">
-                <a16:creationId xmlns:a16="http://schemas.microsoft.com/office/drawing/2014/main" xmlns="" id="{D6F75EBD-1588-D9FC-1FB7-A186EBB9F024}"/>
+                <a16:creationId xmlns:a16="http://schemas.microsoft.com/office/drawing/2014/main" id="{D6F75EBD-1588-D9FC-1FB7-A186EBB9F024}"/>
               </a:ext>
             </a:extLst>
           </p:cNvPr>
@@ -4293,7 +4296,7 @@
           <p:cNvPr id="3" name="Content Placeholder 2">
             <a:extLst>
               <a:ext uri="{FF2B5EF4-FFF2-40B4-BE49-F238E27FC236}">
-                <a16:creationId xmlns:a16="http://schemas.microsoft.com/office/drawing/2014/main" xmlns="" id="{64FCE154-4EB2-8A46-C32D-CDEC8B38A36D}"/>
+                <a16:creationId xmlns:a16="http://schemas.microsoft.com/office/drawing/2014/main" id="{64FCE154-4EB2-8A46-C32D-CDEC8B38A36D}"/>
               </a:ext>
             </a:extLst>
           </p:cNvPr>
@@ -4323,7 +4326,7 @@
               <a:buAutoNum type="arabicPeriod"/>
             </a:pPr>
             <a:r>
-              <a:rPr lang="vi-VN" sz="2300" b="1" dirty="0" smtClean="0">
+              <a:rPr lang="vi-VN" sz="2300" b="1" dirty="0">
                 <a:latin typeface="Times New Roman" panose="02020603050405020304" pitchFamily="18" charset="0"/>
                 <a:ea typeface="JetBrainsMono NF" panose="02000009000000000000" pitchFamily="50" charset="0"/>
                 <a:cs typeface="Times New Roman" panose="02020603050405020304" pitchFamily="18" charset="0"/>
@@ -4331,7 +4334,7 @@
               <a:t>B</a:t>
             </a:r>
             <a:r>
-              <a:rPr lang="en-US" sz="2300" b="1" dirty="0" err="1" smtClean="0">
+              <a:rPr lang="en-US" sz="2300" b="1" dirty="0" err="1">
                 <a:latin typeface="Times New Roman" panose="02020603050405020304" pitchFamily="18" charset="0"/>
                 <a:ea typeface="JetBrainsMono NF" panose="02000009000000000000" pitchFamily="50" charset="0"/>
                 <a:cs typeface="Times New Roman" panose="02020603050405020304" pitchFamily="18" charset="0"/>
@@ -4339,7 +4342,7 @@
               <a:t>ước</a:t>
             </a:r>
             <a:r>
-              <a:rPr lang="en-US" sz="2300" b="1" dirty="0" smtClean="0">
+              <a:rPr lang="en-US" sz="2300" b="1" dirty="0">
                 <a:latin typeface="Times New Roman" panose="02020603050405020304" pitchFamily="18" charset="0"/>
                 <a:ea typeface="JetBrainsMono NF" panose="02000009000000000000" pitchFamily="50" charset="0"/>
                 <a:cs typeface="Times New Roman" panose="02020603050405020304" pitchFamily="18" charset="0"/>
@@ -4347,7 +4350,7 @@
               <a:t> </a:t>
             </a:r>
             <a:r>
-              <a:rPr lang="vi-VN" sz="2300" b="1" dirty="0" smtClean="0">
+              <a:rPr lang="vi-VN" sz="2300" b="1" dirty="0">
                 <a:latin typeface="Times New Roman" panose="02020603050405020304" pitchFamily="18" charset="0"/>
                 <a:ea typeface="JetBrainsMono NF" panose="02000009000000000000" pitchFamily="50" charset="0"/>
                 <a:cs typeface="Times New Roman" panose="02020603050405020304" pitchFamily="18" charset="0"/>
@@ -4360,7 +4363,15 @@
                 <a:ea typeface="JetBrainsMono NF" panose="02000009000000000000" pitchFamily="50" charset="0"/>
                 <a:cs typeface="Times New Roman" panose="02020603050405020304" pitchFamily="18" charset="0"/>
               </a:rPr>
-              <a:t>: </a:t>
+              <a:t>: Tạo interface cho Strategy</a:t>
+            </a:r>
+            <a:r>
+              <a:rPr lang="en-US" sz="2300" dirty="0">
+                <a:latin typeface="Times New Roman" panose="02020603050405020304" pitchFamily="18" charset="0"/>
+                <a:ea typeface="JetBrainsMono NF" panose="02000009000000000000" pitchFamily="50" charset="0"/>
+                <a:cs typeface="Times New Roman" panose="02020603050405020304" pitchFamily="18" charset="0"/>
+              </a:rPr>
+              <a:t>: t</a:t>
             </a:r>
             <a:r>
               <a:rPr lang="vi-VN" sz="2300" dirty="0">
@@ -4368,41 +4379,9 @@
                 <a:ea typeface="JetBrainsMono NF" panose="02000009000000000000" pitchFamily="50" charset="0"/>
                 <a:cs typeface="Times New Roman" panose="02020603050405020304" pitchFamily="18" charset="0"/>
               </a:rPr>
-              <a:t>Tạo interface cho </a:t>
-            </a:r>
-            <a:r>
-              <a:rPr lang="vi-VN" sz="2300" dirty="0" smtClean="0">
-                <a:latin typeface="Times New Roman" panose="02020603050405020304" pitchFamily="18" charset="0"/>
-                <a:ea typeface="JetBrainsMono NF" panose="02000009000000000000" pitchFamily="50" charset="0"/>
-                <a:cs typeface="Times New Roman" panose="02020603050405020304" pitchFamily="18" charset="0"/>
-              </a:rPr>
-              <a:t>Strategy</a:t>
-            </a:r>
-            <a:r>
-              <a:rPr lang="en-US" sz="2300" dirty="0" smtClean="0">
-                <a:latin typeface="Times New Roman" panose="02020603050405020304" pitchFamily="18" charset="0"/>
-                <a:ea typeface="JetBrainsMono NF" panose="02000009000000000000" pitchFamily="50" charset="0"/>
-                <a:cs typeface="Times New Roman" panose="02020603050405020304" pitchFamily="18" charset="0"/>
-              </a:rPr>
-              <a:t>: t</a:t>
-            </a:r>
-            <a:r>
-              <a:rPr lang="vi-VN" sz="2300" dirty="0" smtClean="0">
-                <a:latin typeface="Times New Roman" panose="02020603050405020304" pitchFamily="18" charset="0"/>
-                <a:ea typeface="JetBrainsMono NF" panose="02000009000000000000" pitchFamily="50" charset="0"/>
-                <a:cs typeface="Times New Roman" panose="02020603050405020304" pitchFamily="18" charset="0"/>
-              </a:rPr>
-              <a:t>ạo </a:t>
-            </a:r>
-            <a:r>
-              <a:rPr lang="vi-VN" sz="2300" dirty="0">
-                <a:latin typeface="Times New Roman" panose="02020603050405020304" pitchFamily="18" charset="0"/>
-                <a:ea typeface="JetBrainsMono NF" panose="02000009000000000000" pitchFamily="50" charset="0"/>
-                <a:cs typeface="Times New Roman" panose="02020603050405020304" pitchFamily="18" charset="0"/>
-              </a:rPr>
-              <a:t>một interface (hoặc lớp trừu tượng) để định nghĩa các phương thức chung cho các thuật toán.</a:t>
-            </a:r>
-            <a:endParaRPr lang="en-US" sz="2300" dirty="0" smtClean="0">
+              <a:t>ạo một interface (hoặc lớp trừu tượng) để định nghĩa các phương thức chung cho các thuật toán.</a:t>
+            </a:r>
+            <a:endParaRPr lang="en-US" sz="2300" dirty="0">
               <a:latin typeface="Times New Roman" panose="02020603050405020304" pitchFamily="18" charset="0"/>
               <a:ea typeface="JetBrainsMono NF" panose="02000009000000000000" pitchFamily="50" charset="0"/>
               <a:cs typeface="Times New Roman" panose="02020603050405020304" pitchFamily="18" charset="0"/>
@@ -4416,7 +4395,7 @@
               <a:buAutoNum type="arabicPeriod"/>
             </a:pPr>
             <a:r>
-              <a:rPr lang="vi-VN" sz="2300" b="1" dirty="0" smtClean="0">
+              <a:rPr lang="vi-VN" sz="2300" b="1" dirty="0">
                 <a:latin typeface="Times New Roman" panose="02020603050405020304" pitchFamily="18" charset="0"/>
                 <a:ea typeface="JetBrainsMono NF" panose="02000009000000000000" pitchFamily="50" charset="0"/>
                 <a:cs typeface="Times New Roman" panose="02020603050405020304" pitchFamily="18" charset="0"/>
@@ -4424,7 +4403,7 @@
               <a:t>B</a:t>
             </a:r>
             <a:r>
-              <a:rPr lang="en-US" sz="2300" b="1" dirty="0" err="1" smtClean="0">
+              <a:rPr lang="en-US" sz="2300" b="1" dirty="0" err="1">
                 <a:latin typeface="Times New Roman" panose="02020603050405020304" pitchFamily="18" charset="0"/>
                 <a:ea typeface="JetBrainsMono NF" panose="02000009000000000000" pitchFamily="50" charset="0"/>
                 <a:cs typeface="Times New Roman" panose="02020603050405020304" pitchFamily="18" charset="0"/>
@@ -4432,7 +4411,7 @@
               <a:t>ước</a:t>
             </a:r>
             <a:r>
-              <a:rPr lang="en-US" sz="2300" b="1" dirty="0" smtClean="0">
+              <a:rPr lang="en-US" sz="2300" b="1" dirty="0">
                 <a:latin typeface="Times New Roman" panose="02020603050405020304" pitchFamily="18" charset="0"/>
                 <a:ea typeface="JetBrainsMono NF" panose="02000009000000000000" pitchFamily="50" charset="0"/>
                 <a:cs typeface="Times New Roman" panose="02020603050405020304" pitchFamily="18" charset="0"/>
@@ -4440,7 +4419,7 @@
               <a:t> </a:t>
             </a:r>
             <a:r>
-              <a:rPr lang="vi-VN" sz="2300" b="1" dirty="0" smtClean="0">
+              <a:rPr lang="vi-VN" sz="2300" b="1" dirty="0">
                 <a:latin typeface="Times New Roman" panose="02020603050405020304" pitchFamily="18" charset="0"/>
                 <a:ea typeface="JetBrainsMono NF" panose="02000009000000000000" pitchFamily="50" charset="0"/>
                 <a:cs typeface="Times New Roman" panose="02020603050405020304" pitchFamily="18" charset="0"/>
@@ -4453,7 +4432,15 @@
                 <a:ea typeface="JetBrainsMono NF" panose="02000009000000000000" pitchFamily="50" charset="0"/>
                 <a:cs typeface="Times New Roman" panose="02020603050405020304" pitchFamily="18" charset="0"/>
               </a:rPr>
-              <a:t>: </a:t>
+              <a:t>: Cài đặt các ConcreteStrategy:</a:t>
+            </a:r>
+            <a:r>
+              <a:rPr lang="en-US" sz="2300" dirty="0">
+                <a:latin typeface="Times New Roman" panose="02020603050405020304" pitchFamily="18" charset="0"/>
+                <a:ea typeface="JetBrainsMono NF" panose="02000009000000000000" pitchFamily="50" charset="0"/>
+                <a:cs typeface="Times New Roman" panose="02020603050405020304" pitchFamily="18" charset="0"/>
+              </a:rPr>
+              <a:t> t</a:t>
             </a:r>
             <a:r>
               <a:rPr lang="vi-VN" sz="2300" dirty="0">
@@ -4461,41 +4448,9 @@
                 <a:ea typeface="JetBrainsMono NF" panose="02000009000000000000" pitchFamily="50" charset="0"/>
                 <a:cs typeface="Times New Roman" panose="02020603050405020304" pitchFamily="18" charset="0"/>
               </a:rPr>
-              <a:t>Cài đặt các </a:t>
-            </a:r>
-            <a:r>
-              <a:rPr lang="vi-VN" sz="2300" dirty="0" smtClean="0">
-                <a:latin typeface="Times New Roman" panose="02020603050405020304" pitchFamily="18" charset="0"/>
-                <a:ea typeface="JetBrainsMono NF" panose="02000009000000000000" pitchFamily="50" charset="0"/>
-                <a:cs typeface="Times New Roman" panose="02020603050405020304" pitchFamily="18" charset="0"/>
-              </a:rPr>
-              <a:t>ConcreteStrategy:</a:t>
-            </a:r>
-            <a:r>
-              <a:rPr lang="en-US" sz="2300" dirty="0" smtClean="0">
-                <a:latin typeface="Times New Roman" panose="02020603050405020304" pitchFamily="18" charset="0"/>
-                <a:ea typeface="JetBrainsMono NF" panose="02000009000000000000" pitchFamily="50" charset="0"/>
-                <a:cs typeface="Times New Roman" panose="02020603050405020304" pitchFamily="18" charset="0"/>
-              </a:rPr>
-              <a:t> t</a:t>
-            </a:r>
-            <a:r>
-              <a:rPr lang="vi-VN" sz="2300" dirty="0" smtClean="0">
-                <a:latin typeface="Times New Roman" panose="02020603050405020304" pitchFamily="18" charset="0"/>
-                <a:ea typeface="JetBrainsMono NF" panose="02000009000000000000" pitchFamily="50" charset="0"/>
-                <a:cs typeface="Times New Roman" panose="02020603050405020304" pitchFamily="18" charset="0"/>
-              </a:rPr>
-              <a:t>ạo </a:t>
-            </a:r>
-            <a:r>
-              <a:rPr lang="vi-VN" sz="2300" dirty="0">
-                <a:latin typeface="Times New Roman" panose="02020603050405020304" pitchFamily="18" charset="0"/>
-                <a:ea typeface="JetBrainsMono NF" panose="02000009000000000000" pitchFamily="50" charset="0"/>
-                <a:cs typeface="Times New Roman" panose="02020603050405020304" pitchFamily="18" charset="0"/>
-              </a:rPr>
-              <a:t>các lớp cụ thể thực hiện các thuật toán riêng biệt</a:t>
-            </a:r>
-            <a:endParaRPr lang="en-US" sz="2300" dirty="0" smtClean="0">
+              <a:t>ạo các lớp cụ thể thực hiện các thuật toán riêng biệt</a:t>
+            </a:r>
+            <a:endParaRPr lang="en-US" sz="2300" dirty="0">
               <a:latin typeface="Times New Roman" panose="02020603050405020304" pitchFamily="18" charset="0"/>
               <a:ea typeface="JetBrainsMono NF" panose="02000009000000000000" pitchFamily="50" charset="0"/>
               <a:cs typeface="Times New Roman" panose="02020603050405020304" pitchFamily="18" charset="0"/>
@@ -4509,7 +4464,7 @@
               <a:buAutoNum type="arabicPeriod"/>
             </a:pPr>
             <a:r>
-              <a:rPr lang="vi-VN" sz="2300" b="1" dirty="0" smtClean="0">
+              <a:rPr lang="vi-VN" sz="2300" b="1" dirty="0">
                 <a:latin typeface="Times New Roman" panose="02020603050405020304" pitchFamily="18" charset="0"/>
                 <a:ea typeface="JetBrainsMono NF" panose="02000009000000000000" pitchFamily="50" charset="0"/>
                 <a:cs typeface="Times New Roman" panose="02020603050405020304" pitchFamily="18" charset="0"/>
@@ -4517,7 +4472,7 @@
               <a:t>B</a:t>
             </a:r>
             <a:r>
-              <a:rPr lang="en-US" sz="2300" b="1" dirty="0" err="1" smtClean="0">
+              <a:rPr lang="en-US" sz="2300" b="1" dirty="0" err="1">
                 <a:latin typeface="Times New Roman" panose="02020603050405020304" pitchFamily="18" charset="0"/>
                 <a:ea typeface="JetBrainsMono NF" panose="02000009000000000000" pitchFamily="50" charset="0"/>
                 <a:cs typeface="Times New Roman" panose="02020603050405020304" pitchFamily="18" charset="0"/>
@@ -4525,7 +4480,7 @@
               <a:t>ước</a:t>
             </a:r>
             <a:r>
-              <a:rPr lang="en-US" sz="2300" b="1" dirty="0" smtClean="0">
+              <a:rPr lang="en-US" sz="2300" b="1" dirty="0">
                 <a:latin typeface="Times New Roman" panose="02020603050405020304" pitchFamily="18" charset="0"/>
                 <a:ea typeface="JetBrainsMono NF" panose="02000009000000000000" pitchFamily="50" charset="0"/>
                 <a:cs typeface="Times New Roman" panose="02020603050405020304" pitchFamily="18" charset="0"/>
@@ -4533,7 +4488,7 @@
               <a:t> </a:t>
             </a:r>
             <a:r>
-              <a:rPr lang="vi-VN" sz="2300" b="1" dirty="0" smtClean="0">
+              <a:rPr lang="vi-VN" sz="2300" b="1" dirty="0">
                 <a:latin typeface="Times New Roman" panose="02020603050405020304" pitchFamily="18" charset="0"/>
                 <a:ea typeface="JetBrainsMono NF" panose="02000009000000000000" pitchFamily="50" charset="0"/>
                 <a:cs typeface="Times New Roman" panose="02020603050405020304" pitchFamily="18" charset="0"/>
@@ -4546,7 +4501,15 @@
                 <a:ea typeface="JetBrainsMono NF" panose="02000009000000000000" pitchFamily="50" charset="0"/>
                 <a:cs typeface="Times New Roman" panose="02020603050405020304" pitchFamily="18" charset="0"/>
               </a:rPr>
-              <a:t>: </a:t>
+              <a:t>: Tạo Context</a:t>
+            </a:r>
+            <a:r>
+              <a:rPr lang="en-US" sz="2300" dirty="0">
+                <a:latin typeface="Times New Roman" panose="02020603050405020304" pitchFamily="18" charset="0"/>
+                <a:ea typeface="JetBrainsMono NF" panose="02000009000000000000" pitchFamily="50" charset="0"/>
+                <a:cs typeface="Times New Roman" panose="02020603050405020304" pitchFamily="18" charset="0"/>
+              </a:rPr>
+              <a:t>: t</a:t>
             </a:r>
             <a:r>
               <a:rPr lang="vi-VN" sz="2300" dirty="0">
@@ -4554,81 +4517,25 @@
                 <a:ea typeface="JetBrainsMono NF" panose="02000009000000000000" pitchFamily="50" charset="0"/>
                 <a:cs typeface="Times New Roman" panose="02020603050405020304" pitchFamily="18" charset="0"/>
               </a:rPr>
-              <a:t>Tạo </a:t>
-            </a:r>
-            <a:r>
-              <a:rPr lang="vi-VN" sz="2300" dirty="0" smtClean="0">
+              <a:t>ạo một lớp Context (ví dụ</a:t>
+            </a:r>
+            <a:r>
+              <a:rPr lang="en-US" sz="2300" dirty="0">
                 <a:latin typeface="Times New Roman" panose="02020603050405020304" pitchFamily="18" charset="0"/>
                 <a:ea typeface="JetBrainsMono NF" panose="02000009000000000000" pitchFamily="50" charset="0"/>
                 <a:cs typeface="Times New Roman" panose="02020603050405020304" pitchFamily="18" charset="0"/>
               </a:rPr>
-              <a:t>Context</a:t>
-            </a:r>
-            <a:r>
-              <a:rPr lang="en-US" sz="2300" dirty="0" smtClean="0">
+              <a:t>:</a:t>
+            </a:r>
+            <a:r>
+              <a:rPr lang="vi-VN" sz="2300" dirty="0">
                 <a:latin typeface="Times New Roman" panose="02020603050405020304" pitchFamily="18" charset="0"/>
                 <a:ea typeface="JetBrainsMono NF" panose="02000009000000000000" pitchFamily="50" charset="0"/>
                 <a:cs typeface="Times New Roman" panose="02020603050405020304" pitchFamily="18" charset="0"/>
               </a:rPr>
-              <a:t>: </a:t>
-            </a:r>
-            <a:r>
-              <a:rPr lang="en-US" sz="2300" dirty="0">
-                <a:latin typeface="Times New Roman" panose="02020603050405020304" pitchFamily="18" charset="0"/>
-                <a:ea typeface="JetBrainsMono NF" panose="02000009000000000000" pitchFamily="50" charset="0"/>
-                <a:cs typeface="Times New Roman" panose="02020603050405020304" pitchFamily="18" charset="0"/>
-              </a:rPr>
-              <a:t>t</a:t>
-            </a:r>
-            <a:r>
-              <a:rPr lang="vi-VN" sz="2300" dirty="0" smtClean="0">
-                <a:latin typeface="Times New Roman" panose="02020603050405020304" pitchFamily="18" charset="0"/>
-                <a:ea typeface="JetBrainsMono NF" panose="02000009000000000000" pitchFamily="50" charset="0"/>
-                <a:cs typeface="Times New Roman" panose="02020603050405020304" pitchFamily="18" charset="0"/>
-              </a:rPr>
-              <a:t>ạo </a:t>
-            </a:r>
-            <a:r>
-              <a:rPr lang="vi-VN" sz="2300" dirty="0">
-                <a:latin typeface="Times New Roman" panose="02020603050405020304" pitchFamily="18" charset="0"/>
-                <a:ea typeface="JetBrainsMono NF" panose="02000009000000000000" pitchFamily="50" charset="0"/>
-                <a:cs typeface="Times New Roman" panose="02020603050405020304" pitchFamily="18" charset="0"/>
-              </a:rPr>
-              <a:t>một lớp Context (ví </a:t>
-            </a:r>
-            <a:r>
-              <a:rPr lang="vi-VN" sz="2300" dirty="0" smtClean="0">
-                <a:latin typeface="Times New Roman" panose="02020603050405020304" pitchFamily="18" charset="0"/>
-                <a:ea typeface="JetBrainsMono NF" panose="02000009000000000000" pitchFamily="50" charset="0"/>
-                <a:cs typeface="Times New Roman" panose="02020603050405020304" pitchFamily="18" charset="0"/>
-              </a:rPr>
-              <a:t>dụ</a:t>
-            </a:r>
-            <a:r>
-              <a:rPr lang="en-US" sz="2300" dirty="0" smtClean="0">
-                <a:latin typeface="Times New Roman" panose="02020603050405020304" pitchFamily="18" charset="0"/>
-                <a:ea typeface="JetBrainsMono NF" panose="02000009000000000000" pitchFamily="50" charset="0"/>
-                <a:cs typeface="Times New Roman" panose="02020603050405020304" pitchFamily="18" charset="0"/>
-              </a:rPr>
-              <a:t>:</a:t>
-            </a:r>
-            <a:r>
-              <a:rPr lang="vi-VN" sz="2300" dirty="0" smtClean="0">
-                <a:latin typeface="Times New Roman" panose="02020603050405020304" pitchFamily="18" charset="0"/>
-                <a:ea typeface="JetBrainsMono NF" panose="02000009000000000000" pitchFamily="50" charset="0"/>
-                <a:cs typeface="Times New Roman" panose="02020603050405020304" pitchFamily="18" charset="0"/>
-              </a:rPr>
-              <a:t> </a:t>
-            </a:r>
-            <a:r>
-              <a:rPr lang="vi-VN" sz="2300" dirty="0">
-                <a:latin typeface="Times New Roman" panose="02020603050405020304" pitchFamily="18" charset="0"/>
-                <a:ea typeface="JetBrainsMono NF" panose="02000009000000000000" pitchFamily="50" charset="0"/>
-                <a:cs typeface="Times New Roman" panose="02020603050405020304" pitchFamily="18" charset="0"/>
-              </a:rPr>
-              <a:t>SortContext) chứa tham chiếu đến đối tượng Strategy và nhận các yêu cầu từ Client. Context sẽ ủy quyền cho Strategy thực hiện công việc tương ứng.</a:t>
-            </a:r>
-            <a:endParaRPr lang="en-US" sz="2300" dirty="0" smtClean="0">
+              <a:t> SortContext) chứa tham chiếu đến đối tượng Strategy và nhận các yêu cầu từ Client. Context sẽ ủy quyền cho Strategy thực hiện công việc tương ứng.</a:t>
+            </a:r>
+            <a:endParaRPr lang="en-US" sz="2300" dirty="0">
               <a:latin typeface="Times New Roman" panose="02020603050405020304" pitchFamily="18" charset="0"/>
               <a:ea typeface="JetBrainsMono NF" panose="02000009000000000000" pitchFamily="50" charset="0"/>
               <a:cs typeface="Times New Roman" panose="02020603050405020304" pitchFamily="18" charset="0"/>
@@ -4642,7 +4549,7 @@
               <a:buAutoNum type="arabicPeriod"/>
             </a:pPr>
             <a:r>
-              <a:rPr lang="vi-VN" sz="2300" b="1" dirty="0" smtClean="0">
+              <a:rPr lang="vi-VN" sz="2300" b="1" dirty="0">
                 <a:latin typeface="Times New Roman" panose="02020603050405020304" pitchFamily="18" charset="0"/>
                 <a:ea typeface="JetBrainsMono NF" panose="02000009000000000000" pitchFamily="50" charset="0"/>
                 <a:cs typeface="Times New Roman" panose="02020603050405020304" pitchFamily="18" charset="0"/>
@@ -4650,7 +4557,7 @@
               <a:t>B</a:t>
             </a:r>
             <a:r>
-              <a:rPr lang="en-US" sz="2300" b="1" dirty="0" err="1" smtClean="0">
+              <a:rPr lang="en-US" sz="2300" b="1" dirty="0" err="1">
                 <a:latin typeface="Times New Roman" panose="02020603050405020304" pitchFamily="18" charset="0"/>
                 <a:ea typeface="JetBrainsMono NF" panose="02000009000000000000" pitchFamily="50" charset="0"/>
                 <a:cs typeface="Times New Roman" panose="02020603050405020304" pitchFamily="18" charset="0"/>
@@ -4658,7 +4565,7 @@
               <a:t>ước</a:t>
             </a:r>
             <a:r>
-              <a:rPr lang="en-US" sz="2300" b="1" dirty="0" smtClean="0">
+              <a:rPr lang="en-US" sz="2300" b="1" dirty="0">
                 <a:latin typeface="Times New Roman" panose="02020603050405020304" pitchFamily="18" charset="0"/>
                 <a:ea typeface="JetBrainsMono NF" panose="02000009000000000000" pitchFamily="50" charset="0"/>
                 <a:cs typeface="Times New Roman" panose="02020603050405020304" pitchFamily="18" charset="0"/>
@@ -4666,42 +4573,29 @@
               <a:t> </a:t>
             </a:r>
             <a:r>
-              <a:rPr lang="vi-VN" sz="2300" b="1" dirty="0" smtClean="0">
+              <a:rPr lang="vi-VN" sz="2300" b="1" dirty="0">
                 <a:latin typeface="Times New Roman" panose="02020603050405020304" pitchFamily="18" charset="0"/>
                 <a:ea typeface="JetBrainsMono NF" panose="02000009000000000000" pitchFamily="50" charset="0"/>
                 <a:cs typeface="Times New Roman" panose="02020603050405020304" pitchFamily="18" charset="0"/>
               </a:rPr>
-              <a:t>4</a:t>
-            </a:r>
-            <a:r>
-              <a:rPr lang="vi-VN" sz="2300" b="1" dirty="0" smtClean="0">
+              <a:t>4:</a:t>
+            </a:r>
+            <a:r>
+              <a:rPr lang="en-US" sz="2300" b="1" dirty="0">
                 <a:latin typeface="Times New Roman" panose="02020603050405020304" pitchFamily="18" charset="0"/>
                 <a:ea typeface="JetBrainsMono NF" panose="02000009000000000000" pitchFamily="50" charset="0"/>
                 <a:cs typeface="Times New Roman" panose="02020603050405020304" pitchFamily="18" charset="0"/>
               </a:rPr>
-              <a:t>:</a:t>
-            </a:r>
-            <a:r>
-              <a:rPr lang="en-US" sz="2300" b="1" dirty="0" smtClean="0">
+              <a:t> </a:t>
+            </a:r>
+            <a:r>
+              <a:rPr lang="en-US" sz="2300" dirty="0">
                 <a:latin typeface="Times New Roman" panose="02020603050405020304" pitchFamily="18" charset="0"/>
                 <a:ea typeface="JetBrainsMono NF" panose="02000009000000000000" pitchFamily="50" charset="0"/>
                 <a:cs typeface="Times New Roman" panose="02020603050405020304" pitchFamily="18" charset="0"/>
               </a:rPr>
-              <a:t> </a:t>
-            </a:r>
-            <a:r>
-              <a:rPr lang="en-US" sz="2300" dirty="0" smtClean="0">
-                <a:latin typeface="Times New Roman" panose="02020603050405020304" pitchFamily="18" charset="0"/>
-                <a:ea typeface="JetBrainsMono NF" panose="02000009000000000000" pitchFamily="50" charset="0"/>
-                <a:cs typeface="Times New Roman" panose="02020603050405020304" pitchFamily="18" charset="0"/>
-              </a:rPr>
               <a:t>execute Strategy</a:t>
             </a:r>
-            <a:endParaRPr lang="en-US" sz="2300" dirty="0" smtClean="0">
-              <a:latin typeface="Times New Roman" panose="02020603050405020304" pitchFamily="18" charset="0"/>
-              <a:ea typeface="JetBrainsMono NF" panose="02000009000000000000" pitchFamily="50" charset="0"/>
-              <a:cs typeface="Times New Roman" panose="02020603050405020304" pitchFamily="18" charset="0"/>
-            </a:endParaRPr>
           </a:p>
         </p:txBody>
       </p:sp>
@@ -4715,13 +4609,6 @@
   <p:clrMapOvr>
     <a:masterClrMapping/>
   </p:clrMapOvr>
-  <p:timing>
-    <p:tnLst>
-      <p:par>
-        <p:cTn id="1" dur="indefinite" restart="never" nodeType="tmRoot"/>
-      </p:par>
-    </p:tnLst>
-  </p:timing>
 </p:sld>
 </file>
 
@@ -4763,31 +4650,31 @@
           <a:lstStyle/>
           <a:p>
             <a:r>
-              <a:rPr lang="en-US" dirty="0" err="1" smtClean="0"/>
+              <a:rPr lang="en-US" dirty="0" err="1"/>
               <a:t>Ví</a:t>
             </a:r>
             <a:r>
-              <a:rPr lang="en-US" dirty="0" smtClean="0"/>
+              <a:rPr lang="en-US" dirty="0"/>
               <a:t> </a:t>
             </a:r>
             <a:r>
-              <a:rPr lang="en-US" dirty="0" err="1" smtClean="0"/>
+              <a:rPr lang="en-US" dirty="0" err="1"/>
               <a:t>dụ</a:t>
             </a:r>
             <a:r>
-              <a:rPr lang="en-US" dirty="0" smtClean="0"/>
+              <a:rPr lang="en-US" dirty="0"/>
               <a:t> </a:t>
             </a:r>
             <a:r>
-              <a:rPr lang="en-US" dirty="0" err="1" smtClean="0"/>
+              <a:rPr lang="en-US" dirty="0" err="1"/>
               <a:t>thực</a:t>
             </a:r>
             <a:r>
-              <a:rPr lang="en-US" dirty="0" smtClean="0"/>
+              <a:rPr lang="en-US" dirty="0"/>
               <a:t> </a:t>
             </a:r>
             <a:r>
-              <a:rPr lang="en-US" dirty="0" err="1" smtClean="0"/>
+              <a:rPr lang="en-US" dirty="0" err="1"/>
               <a:t>tế</a:t>
             </a:r>
             <a:endParaRPr lang="en-US" dirty="0"/>
@@ -4857,32 +4744,18 @@
           <a:lstStyle/>
           <a:p>
             <a:r>
-              <a:rPr lang="en-US" dirty="0" smtClean="0">
+              <a:rPr lang="en-US" dirty="0">
                 <a:latin typeface="Times New Roman" pitchFamily="18" charset="0"/>
                 <a:cs typeface="Times New Roman" pitchFamily="18" charset="0"/>
               </a:rPr>
               <a:t>S</a:t>
-            </a:r>
-            <a:r>
-              <a:rPr lang="vi-VN" dirty="0" smtClean="0">
-                <a:latin typeface="Times New Roman" pitchFamily="18" charset="0"/>
-                <a:cs typeface="Times New Roman" pitchFamily="18" charset="0"/>
-              </a:rPr>
-              <a:t>ử </a:t>
             </a:r>
             <a:r>
               <a:rPr lang="vi-VN" dirty="0">
                 <a:latin typeface="Times New Roman" pitchFamily="18" charset="0"/>
                 <a:cs typeface="Times New Roman" pitchFamily="18" charset="0"/>
               </a:rPr>
-              <a:t>dụng Strategy Pattern để xử lý các phương thức thanh toán khác nhau một cách linh </a:t>
-            </a:r>
-            <a:r>
-              <a:rPr lang="vi-VN" dirty="0" smtClean="0">
-                <a:latin typeface="Times New Roman" pitchFamily="18" charset="0"/>
-                <a:cs typeface="Times New Roman" pitchFamily="18" charset="0"/>
-              </a:rPr>
-              <a:t>hoạt</a:t>
+              <a:t>ử dụng Strategy Pattern để xử lý các phương thức thanh toán khác nhau một cách linh hoạt</a:t>
             </a:r>
             <a:r>
               <a:rPr lang="en-US" dirty="0">
@@ -4892,79 +4765,47 @@
               <a:t>,</a:t>
             </a:r>
             <a:r>
-              <a:rPr lang="vi-VN" dirty="0" smtClean="0">
-                <a:latin typeface="Times New Roman" pitchFamily="18" charset="0"/>
-                <a:cs typeface="Times New Roman" pitchFamily="18" charset="0"/>
-              </a:rPr>
-              <a:t> </a:t>
-            </a:r>
-            <a:r>
               <a:rPr lang="vi-VN" dirty="0">
                 <a:latin typeface="Times New Roman" pitchFamily="18" charset="0"/>
                 <a:cs typeface="Times New Roman" pitchFamily="18" charset="0"/>
               </a:rPr>
-              <a:t>nơi người dùng có thể chọn từ nhiều phương thức thanh toán khác nhau như thẻ tín dụng, ví điện tử, chuyển khoản ngân </a:t>
-            </a:r>
-            <a:r>
-              <a:rPr lang="vi-VN" dirty="0" smtClean="0">
+              <a:t> nơi người dùng có thể chọn từ nhiều phương thức thanh toán khác nhau như thẻ tín dụng, ví điện tử, chuyển khoản ngân hàng,</a:t>
+            </a:r>
+            <a:r>
+              <a:rPr lang="en-US" dirty="0">
                 <a:latin typeface="Times New Roman" pitchFamily="18" charset="0"/>
                 <a:cs typeface="Times New Roman" pitchFamily="18" charset="0"/>
               </a:rPr>
-              <a:t>hàng,</a:t>
-            </a:r>
-            <a:r>
-              <a:rPr lang="en-US" dirty="0" smtClean="0">
+              <a:t> </a:t>
+            </a:r>
+            <a:r>
+              <a:rPr lang="en-US" dirty="0" err="1">
                 <a:latin typeface="Times New Roman" pitchFamily="18" charset="0"/>
                 <a:cs typeface="Times New Roman" pitchFamily="18" charset="0"/>
               </a:rPr>
-              <a:t> </a:t>
-            </a:r>
-            <a:r>
-              <a:rPr lang="en-US" dirty="0" err="1" smtClean="0">
+              <a:t>Momo</a:t>
+            </a:r>
+            <a:r>
+              <a:rPr lang="en-US" dirty="0">
                 <a:latin typeface="Times New Roman" pitchFamily="18" charset="0"/>
                 <a:cs typeface="Times New Roman" pitchFamily="18" charset="0"/>
               </a:rPr>
-              <a:t>Momo</a:t>
-            </a:r>
-            <a:r>
-              <a:rPr lang="en-US" dirty="0" smtClean="0">
-                <a:latin typeface="Times New Roman" pitchFamily="18" charset="0"/>
-                <a:cs typeface="Times New Roman" pitchFamily="18" charset="0"/>
-              </a:rPr>
               <a:t>,</a:t>
-            </a:r>
-            <a:r>
-              <a:rPr lang="vi-VN" dirty="0" smtClean="0">
-                <a:latin typeface="Times New Roman" pitchFamily="18" charset="0"/>
-                <a:cs typeface="Times New Roman" pitchFamily="18" charset="0"/>
-              </a:rPr>
-              <a:t> </a:t>
             </a:r>
             <a:r>
               <a:rPr lang="vi-VN" dirty="0">
                 <a:latin typeface="Times New Roman" pitchFamily="18" charset="0"/>
                 <a:cs typeface="Times New Roman" pitchFamily="18" charset="0"/>
               </a:rPr>
-              <a:t>PayPal</a:t>
-            </a:r>
-            <a:r>
-              <a:rPr lang="vi-VN" dirty="0" smtClean="0">
+              <a:t> PayPal,</a:t>
+            </a:r>
+            <a:r>
+              <a:rPr lang="en-US" dirty="0">
                 <a:latin typeface="Times New Roman" pitchFamily="18" charset="0"/>
                 <a:cs typeface="Times New Roman" pitchFamily="18" charset="0"/>
               </a:rPr>
-              <a:t>,</a:t>
-            </a:r>
-            <a:r>
-              <a:rPr lang="en-US" dirty="0" smtClean="0">
-                <a:latin typeface="Times New Roman" pitchFamily="18" charset="0"/>
-                <a:cs typeface="Times New Roman" pitchFamily="18" charset="0"/>
-              </a:rPr>
               <a:t>…</a:t>
             </a:r>
-            <a:endParaRPr lang="en-US" dirty="0">
-              <a:latin typeface="Times New Roman" pitchFamily="18" charset="0"/>
-              <a:cs typeface="Times New Roman" pitchFamily="18" charset="0"/>
-            </a:endParaRPr>
           </a:p>
         </p:txBody>
       </p:sp>
@@ -4978,13 +4819,6 @@
   <p:clrMapOvr>
     <a:masterClrMapping/>
   </p:clrMapOvr>
-  <p:timing>
-    <p:tnLst>
-      <p:par>
-        <p:cTn id="1" dur="indefinite" restart="never" nodeType="tmRoot"/>
-      </p:par>
-    </p:tnLst>
-  </p:timing>
 </p:sld>
 </file>
 
@@ -5010,7 +4844,7 @@
           <p:cNvPr id="2" name="Title 1">
             <a:extLst>
               <a:ext uri="{FF2B5EF4-FFF2-40B4-BE49-F238E27FC236}">
-                <a16:creationId xmlns:a16="http://schemas.microsoft.com/office/drawing/2014/main" xmlns="" id="{FE3A87F1-749E-0751-90E2-DE1F60B4CBCF}"/>
+                <a16:creationId xmlns:a16="http://schemas.microsoft.com/office/drawing/2014/main" id="{FE3A87F1-749E-0751-90E2-DE1F60B4CBCF}"/>
               </a:ext>
             </a:extLst>
           </p:cNvPr>
@@ -5212,13 +5046,6 @@
   <p:clrMapOvr>
     <a:masterClrMapping/>
   </p:clrMapOvr>
-  <p:timing>
-    <p:tnLst>
-      <p:par>
-        <p:cTn id="1" dur="indefinite" restart="never" nodeType="tmRoot"/>
-      </p:par>
-    </p:tnLst>
-  </p:timing>
 </p:sld>
 </file>
 
@@ -5244,7 +5071,7 @@
           <p:cNvPr id="2" name="Title 1">
             <a:extLst>
               <a:ext uri="{FF2B5EF4-FFF2-40B4-BE49-F238E27FC236}">
-                <a16:creationId xmlns:a16="http://schemas.microsoft.com/office/drawing/2014/main" xmlns="" id="{DD0F04F4-2656-2B9E-39C4-98F0D981C30F}"/>
+                <a16:creationId xmlns:a16="http://schemas.microsoft.com/office/drawing/2014/main" id="{DD0F04F4-2656-2B9E-39C4-98F0D981C30F}"/>
               </a:ext>
             </a:extLst>
           </p:cNvPr>
@@ -5307,12 +5134,12 @@
               </a:rPr>
               <a:t>: Có chung cấu trúc, dựa trên composition (Giao phó trách nhiệm cho các đối tượng khác) tuy nhiên giải quyết các vấn đề khác nhau. </a:t>
             </a:r>
-            <a:endParaRPr lang="en-US" sz="2400" dirty="0" smtClean="0">
+            <a:endParaRPr lang="en-US" sz="2400" dirty="0">
               <a:latin typeface="+mj-lt"/>
             </a:endParaRPr>
           </a:p>
           <a:p>
-            <a:endParaRPr lang="en-US" sz="2400" dirty="0" smtClean="0">
+            <a:endParaRPr lang="en-US" sz="2400" dirty="0">
               <a:latin typeface="+mj-lt"/>
             </a:endParaRPr>
           </a:p>
@@ -5322,7 +5149,7 @@
               <a:buChar char="•"/>
             </a:pPr>
             <a:r>
-              <a:rPr lang="vi-VN" sz="2400" b="1" dirty="0" smtClean="0">
+              <a:rPr lang="vi-VN" sz="2400" b="1" dirty="0">
                 <a:latin typeface="+mj-lt"/>
               </a:rPr>
               <a:t>Command</a:t>
@@ -5333,12 +5160,12 @@
               </a:rPr>
               <a:t>: Khá giống nhau khi đều tham số hoá một đối tượng với một vài hành động tuy nhiên có intents khác nhau. </a:t>
             </a:r>
-            <a:endParaRPr lang="en-US" sz="2400" dirty="0" smtClean="0">
+            <a:endParaRPr lang="en-US" sz="2400" dirty="0">
               <a:latin typeface="+mj-lt"/>
             </a:endParaRPr>
           </a:p>
           <a:p>
-            <a:endParaRPr lang="en-US" sz="2400" dirty="0" smtClean="0">
+            <a:endParaRPr lang="en-US" sz="2400" dirty="0">
               <a:latin typeface="+mj-lt"/>
             </a:endParaRPr>
           </a:p>
@@ -5348,7 +5175,7 @@
               <a:buChar char="•"/>
             </a:pPr>
             <a:r>
-              <a:rPr lang="vi-VN" sz="2400" b="1" dirty="0" smtClean="0">
+              <a:rPr lang="vi-VN" sz="2400" b="1" dirty="0">
                 <a:latin typeface="+mj-lt"/>
               </a:rPr>
               <a:t>State</a:t>
@@ -5375,13 +5202,6 @@
   <p:clrMapOvr>
     <a:masterClrMapping/>
   </p:clrMapOvr>
-  <p:timing>
-    <p:tnLst>
-      <p:par>
-        <p:cTn id="1" dur="indefinite" restart="never" nodeType="tmRoot"/>
-      </p:par>
-    </p:tnLst>
-  </p:timing>
 </p:sld>
 </file>
 
@@ -5407,7 +5227,7 @@
           <p:cNvPr id="2" name="Title 1">
             <a:extLst>
               <a:ext uri="{FF2B5EF4-FFF2-40B4-BE49-F238E27FC236}">
-                <a16:creationId xmlns:a16="http://schemas.microsoft.com/office/drawing/2014/main" xmlns="" id="{922F7E55-70BD-EB96-36EC-49517731295F}"/>
+                <a16:creationId xmlns:a16="http://schemas.microsoft.com/office/drawing/2014/main" id="{922F7E55-70BD-EB96-36EC-49517731295F}"/>
               </a:ext>
             </a:extLst>
           </p:cNvPr>
@@ -5448,13 +5268,6 @@
   <p:clrMapOvr>
     <a:masterClrMapping/>
   </p:clrMapOvr>
-  <p:timing>
-    <p:tnLst>
-      <p:par>
-        <p:cTn id="1" dur="indefinite" restart="never" nodeType="tmRoot"/>
-      </p:par>
-    </p:tnLst>
-  </p:timing>
 </p:sld>
 </file>
 
@@ -5488,10 +5301,10 @@
           <p:cNvPr id="15" name="Rectangle 14">
             <a:extLst>
               <a:ext uri="{FF2B5EF4-FFF2-40B4-BE49-F238E27FC236}">
-                <a16:creationId xmlns:a16="http://schemas.microsoft.com/office/drawing/2014/main" xmlns="" id="{058A14AF-9FB5-4CC7-BA35-E8E85D3EDF0E}"/>
+                <a16:creationId xmlns:a16="http://schemas.microsoft.com/office/drawing/2014/main" id="{058A14AF-9FB5-4CC7-BA35-E8E85D3EDF0E}"/>
               </a:ext>
               <a:ext uri="{C183D7F6-B498-43B3-948B-1728B52AA6E4}">
-                <adec:decorative xmlns:adec="http://schemas.microsoft.com/office/drawing/2017/decorative" xmlns="" val="1"/>
+                <adec:decorative xmlns:adec="http://schemas.microsoft.com/office/drawing/2017/decorative" val="1"/>
               </a:ext>
             </a:extLst>
           </p:cNvPr>
@@ -5501,7 +5314,7 @@
           <p:nvPr>
             <p:extLst>
               <p:ext uri="{386F3935-93C4-4BCD-93E2-E3B085C9AB24}">
-                <p16:designElem xmlns:p16="http://schemas.microsoft.com/office/powerpoint/2015/main" xmlns="" val="1"/>
+                <p16:designElem xmlns:p16="http://schemas.microsoft.com/office/powerpoint/2015/main" val="1"/>
               </p:ext>
             </p:extLst>
           </p:nvPr>
@@ -5548,7 +5361,7 @@
           <p:cNvPr id="2" name="Title 1">
             <a:extLst>
               <a:ext uri="{FF2B5EF4-FFF2-40B4-BE49-F238E27FC236}">
-                <a16:creationId xmlns:a16="http://schemas.microsoft.com/office/drawing/2014/main" xmlns="" id="{ABBE3BCC-C87F-727D-33FB-3420E39B1B50}"/>
+                <a16:creationId xmlns:a16="http://schemas.microsoft.com/office/drawing/2014/main" id="{ABBE3BCC-C87F-727D-33FB-3420E39B1B50}"/>
               </a:ext>
             </a:extLst>
           </p:cNvPr>
@@ -5587,10 +5400,10 @@
           <p:cNvPr id="17" name="Rectangle 16">
             <a:extLst>
               <a:ext uri="{FF2B5EF4-FFF2-40B4-BE49-F238E27FC236}">
-                <a16:creationId xmlns:a16="http://schemas.microsoft.com/office/drawing/2014/main" xmlns="" id="{3A9A4357-BD1D-4622-A4FE-766E6AB8DE84}"/>
+                <a16:creationId xmlns:a16="http://schemas.microsoft.com/office/drawing/2014/main" id="{3A9A4357-BD1D-4622-A4FE-766E6AB8DE84}"/>
               </a:ext>
               <a:ext uri="{C183D7F6-B498-43B3-948B-1728B52AA6E4}">
-                <adec:decorative xmlns:adec="http://schemas.microsoft.com/office/drawing/2017/decorative" xmlns="" val="1"/>
+                <adec:decorative xmlns:adec="http://schemas.microsoft.com/office/drawing/2017/decorative" val="1"/>
               </a:ext>
             </a:extLst>
           </p:cNvPr>
@@ -5600,7 +5413,7 @@
           <p:nvPr>
             <p:extLst>
               <p:ext uri="{386F3935-93C4-4BCD-93E2-E3B085C9AB24}">
-                <p16:designElem xmlns:p16="http://schemas.microsoft.com/office/powerpoint/2015/main" xmlns="" val="1"/>
+                <p16:designElem xmlns:p16="http://schemas.microsoft.com/office/powerpoint/2015/main" val="1"/>
               </p:ext>
             </p:extLst>
           </p:nvPr>
@@ -5650,10 +5463,10 @@
           <p:cNvPr id="14" name="Rectangle 13">
             <a:extLst>
               <a:ext uri="{FF2B5EF4-FFF2-40B4-BE49-F238E27FC236}">
-                <a16:creationId xmlns:a16="http://schemas.microsoft.com/office/drawing/2014/main" xmlns="" id="{E659831F-0D9A-4C63-9EBB-8435B85A440F}"/>
+                <a16:creationId xmlns:a16="http://schemas.microsoft.com/office/drawing/2014/main" id="{E659831F-0D9A-4C63-9EBB-8435B85A440F}"/>
               </a:ext>
               <a:ext uri="{C183D7F6-B498-43B3-948B-1728B52AA6E4}">
-                <adec:decorative xmlns:adec="http://schemas.microsoft.com/office/drawing/2017/decorative" xmlns="" val="1"/>
+                <adec:decorative xmlns:adec="http://schemas.microsoft.com/office/drawing/2017/decorative" val="1"/>
               </a:ext>
             </a:extLst>
           </p:cNvPr>
@@ -5663,7 +5476,7 @@
           <p:nvPr>
             <p:extLst>
               <p:ext uri="{386F3935-93C4-4BCD-93E2-E3B085C9AB24}">
-                <p16:designElem xmlns:p16="http://schemas.microsoft.com/office/powerpoint/2015/main" xmlns="" val="1"/>
+                <p16:designElem xmlns:p16="http://schemas.microsoft.com/office/powerpoint/2015/main" val="1"/>
               </p:ext>
             </p:extLst>
           </p:nvPr>
@@ -5720,7 +5533,7 @@
           <p:cNvPr id="3" name="Content Placeholder 2">
             <a:extLst>
               <a:ext uri="{FF2B5EF4-FFF2-40B4-BE49-F238E27FC236}">
-                <a16:creationId xmlns:a16="http://schemas.microsoft.com/office/drawing/2014/main" xmlns="" id="{810845F2-7583-8AA4-DA1C-2A878E8DC6F7}"/>
+                <a16:creationId xmlns:a16="http://schemas.microsoft.com/office/drawing/2014/main" id="{810845F2-7583-8AA4-DA1C-2A878E8DC6F7}"/>
               </a:ext>
             </a:extLst>
           </p:cNvPr>
@@ -5780,14 +5593,14 @@
           </a:p>
           <a:p>
             <a:r>
-              <a:rPr lang="en-US" sz="2000" dirty="0" err="1" smtClean="0">
+              <a:rPr lang="en-US" sz="2000" dirty="0" err="1">
                 <a:latin typeface="Times New Roman" panose="02020603050405020304" pitchFamily="18" charset="0"/>
                 <a:cs typeface="Times New Roman" panose="02020603050405020304" pitchFamily="18" charset="0"/>
               </a:rPr>
               <a:t>Đặc</a:t>
             </a:r>
             <a:r>
-              <a:rPr lang="en-US" sz="2000" dirty="0" smtClean="0">
+              <a:rPr lang="en-US" sz="2000" dirty="0">
                 <a:latin typeface="Times New Roman" panose="02020603050405020304" pitchFamily="18" charset="0"/>
                 <a:cs typeface="Times New Roman" panose="02020603050405020304" pitchFamily="18" charset="0"/>
               </a:rPr>
@@ -5821,49 +5634,49 @@
               <a:t> </a:t>
             </a:r>
             <a:r>
-              <a:rPr lang="en-US" sz="2000" dirty="0" err="1" smtClean="0">
+              <a:rPr lang="en-US" sz="2000" dirty="0" err="1">
                 <a:latin typeface="Times New Roman" panose="02020603050405020304" pitchFamily="18" charset="0"/>
                 <a:cs typeface="Times New Roman" panose="02020603050405020304" pitchFamily="18" charset="0"/>
               </a:rPr>
               <a:t>hệ</a:t>
             </a:r>
             <a:r>
-              <a:rPr lang="en-US" sz="2000" dirty="0" smtClean="0">
+              <a:rPr lang="en-US" sz="2000" dirty="0">
                 <a:latin typeface="Times New Roman" panose="02020603050405020304" pitchFamily="18" charset="0"/>
                 <a:cs typeface="Times New Roman" panose="02020603050405020304" pitchFamily="18" charset="0"/>
               </a:rPr>
               <a:t> </a:t>
             </a:r>
             <a:r>
-              <a:rPr lang="en-US" sz="2000" dirty="0" err="1" smtClean="0">
+              <a:rPr lang="en-US" sz="2000" dirty="0" err="1">
                 <a:latin typeface="Times New Roman" panose="02020603050405020304" pitchFamily="18" charset="0"/>
                 <a:cs typeface="Times New Roman" panose="02020603050405020304" pitchFamily="18" charset="0"/>
               </a:rPr>
               <a:t>quả</a:t>
             </a:r>
             <a:r>
-              <a:rPr lang="en-US" sz="2000" dirty="0" smtClean="0">
+              <a:rPr lang="en-US" sz="2000" dirty="0">
                 <a:latin typeface="Times New Roman" panose="02020603050405020304" pitchFamily="18" charset="0"/>
                 <a:cs typeface="Times New Roman" panose="02020603050405020304" pitchFamily="18" charset="0"/>
               </a:rPr>
               <a:t> </a:t>
             </a:r>
             <a:r>
-              <a:rPr lang="en-US" sz="2000" dirty="0" err="1" smtClean="0">
+              <a:rPr lang="en-US" sz="2000" dirty="0" err="1">
                 <a:latin typeface="Times New Roman" panose="02020603050405020304" pitchFamily="18" charset="0"/>
                 <a:cs typeface="Times New Roman" panose="02020603050405020304" pitchFamily="18" charset="0"/>
               </a:rPr>
               <a:t>mang</a:t>
             </a:r>
             <a:r>
-              <a:rPr lang="en-US" sz="2000" dirty="0" smtClean="0">
+              <a:rPr lang="en-US" sz="2000" dirty="0">
                 <a:latin typeface="Times New Roman" panose="02020603050405020304" pitchFamily="18" charset="0"/>
                 <a:cs typeface="Times New Roman" panose="02020603050405020304" pitchFamily="18" charset="0"/>
               </a:rPr>
               <a:t> </a:t>
             </a:r>
             <a:r>
-              <a:rPr lang="en-US" sz="2000" dirty="0" err="1" smtClean="0">
+              <a:rPr lang="en-US" sz="2000" dirty="0" err="1">
                 <a:latin typeface="Times New Roman" panose="02020603050405020304" pitchFamily="18" charset="0"/>
                 <a:cs typeface="Times New Roman" panose="02020603050405020304" pitchFamily="18" charset="0"/>
               </a:rPr>
@@ -5904,94 +5717,11 @@
               <a:t> </a:t>
             </a:r>
             <a:r>
-              <a:rPr lang="en-US" sz="2000" dirty="0" err="1" smtClean="0">
+              <a:rPr lang="en-US" sz="2000" dirty="0" err="1">
                 <a:latin typeface="Times New Roman" panose="02020603050405020304" pitchFamily="18" charset="0"/>
                 <a:cs typeface="Times New Roman" panose="02020603050405020304" pitchFamily="18" charset="0"/>
               </a:rPr>
               <a:t>đặt</a:t>
-            </a:r>
-            <a:endParaRPr lang="en-US" sz="2000" dirty="0" smtClean="0">
-              <a:latin typeface="Times New Roman" panose="02020603050405020304" pitchFamily="18" charset="0"/>
-              <a:cs typeface="Times New Roman" panose="02020603050405020304" pitchFamily="18" charset="0"/>
-            </a:endParaRPr>
-          </a:p>
-          <a:p>
-            <a:r>
-              <a:rPr lang="en-US" sz="2000" dirty="0" err="1" smtClean="0">
-                <a:latin typeface="Times New Roman" panose="02020603050405020304" pitchFamily="18" charset="0"/>
-                <a:cs typeface="Times New Roman" panose="02020603050405020304" pitchFamily="18" charset="0"/>
-              </a:rPr>
-              <a:t>Một</a:t>
-            </a:r>
-            <a:r>
-              <a:rPr lang="en-US" sz="2000" dirty="0" smtClean="0">
-                <a:latin typeface="Times New Roman" panose="02020603050405020304" pitchFamily="18" charset="0"/>
-                <a:cs typeface="Times New Roman" panose="02020603050405020304" pitchFamily="18" charset="0"/>
-              </a:rPr>
-              <a:t> </a:t>
-            </a:r>
-            <a:r>
-              <a:rPr lang="en-US" sz="2000" dirty="0" err="1" smtClean="0">
-                <a:latin typeface="Times New Roman" panose="02020603050405020304" pitchFamily="18" charset="0"/>
-                <a:cs typeface="Times New Roman" panose="02020603050405020304" pitchFamily="18" charset="0"/>
-              </a:rPr>
-              <a:t>số</a:t>
-            </a:r>
-            <a:r>
-              <a:rPr lang="en-US" sz="2000" dirty="0" smtClean="0">
-                <a:latin typeface="Times New Roman" panose="02020603050405020304" pitchFamily="18" charset="0"/>
-                <a:cs typeface="Times New Roman" panose="02020603050405020304" pitchFamily="18" charset="0"/>
-              </a:rPr>
-              <a:t> </a:t>
-            </a:r>
-            <a:r>
-              <a:rPr lang="en-US" sz="2000" dirty="0" err="1" smtClean="0">
-                <a:latin typeface="Times New Roman" panose="02020603050405020304" pitchFamily="18" charset="0"/>
-                <a:cs typeface="Times New Roman" panose="02020603050405020304" pitchFamily="18" charset="0"/>
-              </a:rPr>
-              <a:t>ví</a:t>
-            </a:r>
-            <a:r>
-              <a:rPr lang="en-US" sz="2000" dirty="0" smtClean="0">
-                <a:latin typeface="Times New Roman" panose="02020603050405020304" pitchFamily="18" charset="0"/>
-                <a:cs typeface="Times New Roman" panose="02020603050405020304" pitchFamily="18" charset="0"/>
-              </a:rPr>
-              <a:t> </a:t>
-            </a:r>
-            <a:r>
-              <a:rPr lang="en-US" sz="2000" dirty="0" err="1" smtClean="0">
-                <a:latin typeface="Times New Roman" panose="02020603050405020304" pitchFamily="18" charset="0"/>
-                <a:cs typeface="Times New Roman" panose="02020603050405020304" pitchFamily="18" charset="0"/>
-              </a:rPr>
-              <a:t>dụ</a:t>
-            </a:r>
-            <a:r>
-              <a:rPr lang="en-US" sz="2000" dirty="0" smtClean="0">
-                <a:latin typeface="Times New Roman" panose="02020603050405020304" pitchFamily="18" charset="0"/>
-                <a:cs typeface="Times New Roman" panose="02020603050405020304" pitchFamily="18" charset="0"/>
-              </a:rPr>
-              <a:t> </a:t>
-            </a:r>
-            <a:r>
-              <a:rPr lang="en-US" sz="2000" dirty="0" err="1" smtClean="0">
-                <a:latin typeface="Times New Roman" panose="02020603050405020304" pitchFamily="18" charset="0"/>
-                <a:cs typeface="Times New Roman" panose="02020603050405020304" pitchFamily="18" charset="0"/>
-              </a:rPr>
-              <a:t>thực</a:t>
-            </a:r>
-            <a:r>
-              <a:rPr lang="en-US" sz="2000" dirty="0" smtClean="0">
-                <a:latin typeface="Times New Roman" panose="02020603050405020304" pitchFamily="18" charset="0"/>
-                <a:cs typeface="Times New Roman" panose="02020603050405020304" pitchFamily="18" charset="0"/>
-              </a:rPr>
-              <a:t> </a:t>
-            </a:r>
-            <a:r>
-              <a:rPr lang="en-US" sz="2000" dirty="0" err="1" smtClean="0">
-                <a:latin typeface="Times New Roman" panose="02020603050405020304" pitchFamily="18" charset="0"/>
-                <a:cs typeface="Times New Roman" panose="02020603050405020304" pitchFamily="18" charset="0"/>
-              </a:rPr>
-              <a:t>tế</a:t>
             </a:r>
             <a:endParaRPr lang="en-US" sz="2000" dirty="0">
               <a:latin typeface="Times New Roman" panose="02020603050405020304" pitchFamily="18" charset="0"/>
@@ -6000,11 +5730,81 @@
           </a:p>
           <a:p>
             <a:r>
-              <a:rPr lang="en-US" sz="2000" dirty="0" smtClean="0">
-                <a:latin typeface="Times New Roman" panose="02020603050405020304" pitchFamily="18" charset="0"/>
-                <a:cs typeface="Times New Roman" panose="02020603050405020304" pitchFamily="18" charset="0"/>
-              </a:rPr>
-              <a:t>Demo</a:t>
+              <a:rPr lang="en-US" sz="2000" dirty="0" err="1">
+                <a:latin typeface="Times New Roman" panose="02020603050405020304" pitchFamily="18" charset="0"/>
+                <a:cs typeface="Times New Roman" panose="02020603050405020304" pitchFamily="18" charset="0"/>
+              </a:rPr>
+              <a:t>Một</a:t>
+            </a:r>
+            <a:r>
+              <a:rPr lang="en-US" sz="2000" dirty="0">
+                <a:latin typeface="Times New Roman" panose="02020603050405020304" pitchFamily="18" charset="0"/>
+                <a:cs typeface="Times New Roman" panose="02020603050405020304" pitchFamily="18" charset="0"/>
+              </a:rPr>
+              <a:t> </a:t>
+            </a:r>
+            <a:r>
+              <a:rPr lang="en-US" sz="2000" dirty="0" err="1">
+                <a:latin typeface="Times New Roman" panose="02020603050405020304" pitchFamily="18" charset="0"/>
+                <a:cs typeface="Times New Roman" panose="02020603050405020304" pitchFamily="18" charset="0"/>
+              </a:rPr>
+              <a:t>số</a:t>
+            </a:r>
+            <a:r>
+              <a:rPr lang="en-US" sz="2000" dirty="0">
+                <a:latin typeface="Times New Roman" panose="02020603050405020304" pitchFamily="18" charset="0"/>
+                <a:cs typeface="Times New Roman" panose="02020603050405020304" pitchFamily="18" charset="0"/>
+              </a:rPr>
+              <a:t> </a:t>
+            </a:r>
+            <a:r>
+              <a:rPr lang="en-US" sz="2000" dirty="0" err="1">
+                <a:latin typeface="Times New Roman" panose="02020603050405020304" pitchFamily="18" charset="0"/>
+                <a:cs typeface="Times New Roman" panose="02020603050405020304" pitchFamily="18" charset="0"/>
+              </a:rPr>
+              <a:t>ví</a:t>
+            </a:r>
+            <a:r>
+              <a:rPr lang="en-US" sz="2000" dirty="0">
+                <a:latin typeface="Times New Roman" panose="02020603050405020304" pitchFamily="18" charset="0"/>
+                <a:cs typeface="Times New Roman" panose="02020603050405020304" pitchFamily="18" charset="0"/>
+              </a:rPr>
+              <a:t> </a:t>
+            </a:r>
+            <a:r>
+              <a:rPr lang="en-US" sz="2000" dirty="0" err="1">
+                <a:latin typeface="Times New Roman" panose="02020603050405020304" pitchFamily="18" charset="0"/>
+                <a:cs typeface="Times New Roman" panose="02020603050405020304" pitchFamily="18" charset="0"/>
+              </a:rPr>
+              <a:t>dụ</a:t>
+            </a:r>
+            <a:r>
+              <a:rPr lang="en-US" sz="2000" dirty="0">
+                <a:latin typeface="Times New Roman" panose="02020603050405020304" pitchFamily="18" charset="0"/>
+                <a:cs typeface="Times New Roman" panose="02020603050405020304" pitchFamily="18" charset="0"/>
+              </a:rPr>
+              <a:t> </a:t>
+            </a:r>
+            <a:r>
+              <a:rPr lang="en-US" sz="2000" dirty="0" err="1">
+                <a:latin typeface="Times New Roman" panose="02020603050405020304" pitchFamily="18" charset="0"/>
+                <a:cs typeface="Times New Roman" panose="02020603050405020304" pitchFamily="18" charset="0"/>
+              </a:rPr>
+              <a:t>thực</a:t>
+            </a:r>
+            <a:r>
+              <a:rPr lang="en-US" sz="2000" dirty="0">
+                <a:latin typeface="Times New Roman" panose="02020603050405020304" pitchFamily="18" charset="0"/>
+                <a:cs typeface="Times New Roman" panose="02020603050405020304" pitchFamily="18" charset="0"/>
+              </a:rPr>
+              <a:t> </a:t>
+            </a:r>
+            <a:r>
+              <a:rPr lang="en-US" sz="2000" dirty="0" err="1">
+                <a:latin typeface="Times New Roman" panose="02020603050405020304" pitchFamily="18" charset="0"/>
+                <a:cs typeface="Times New Roman" panose="02020603050405020304" pitchFamily="18" charset="0"/>
+              </a:rPr>
+              <a:t>tế</a:t>
             </a:r>
             <a:endParaRPr lang="en-US" sz="2000" dirty="0">
               <a:latin typeface="Times New Roman" panose="02020603050405020304" pitchFamily="18" charset="0"/>
@@ -6013,6 +5813,15 @@
           </a:p>
           <a:p>
             <a:r>
+              <a:rPr lang="en-US" sz="2000" dirty="0">
+                <a:latin typeface="Times New Roman" panose="02020603050405020304" pitchFamily="18" charset="0"/>
+                <a:cs typeface="Times New Roman" panose="02020603050405020304" pitchFamily="18" charset="0"/>
+              </a:rPr>
+              <a:t>Demo</a:t>
+            </a:r>
+          </a:p>
+          <a:p>
+            <a:r>
               <a:rPr lang="en-US" sz="2000" dirty="0" err="1">
                 <a:latin typeface="Times New Roman" panose="02020603050405020304" pitchFamily="18" charset="0"/>
                 <a:cs typeface="Times New Roman" panose="02020603050405020304" pitchFamily="18" charset="0"/>
@@ -6056,10 +5865,10 @@
           <p:cNvPr id="16" name="Rectangle 15">
             <a:extLst>
               <a:ext uri="{FF2B5EF4-FFF2-40B4-BE49-F238E27FC236}">
-                <a16:creationId xmlns:a16="http://schemas.microsoft.com/office/drawing/2014/main" xmlns="" id="{E6995CE5-F890-4ABA-82A2-26507CE8D2A3}"/>
+                <a16:creationId xmlns:a16="http://schemas.microsoft.com/office/drawing/2014/main" id="{E6995CE5-F890-4ABA-82A2-26507CE8D2A3}"/>
               </a:ext>
               <a:ext uri="{C183D7F6-B498-43B3-948B-1728B52AA6E4}">
-                <adec:decorative xmlns:adec="http://schemas.microsoft.com/office/drawing/2017/decorative" xmlns="" val="1"/>
+                <adec:decorative xmlns:adec="http://schemas.microsoft.com/office/drawing/2017/decorative" val="1"/>
               </a:ext>
             </a:extLst>
           </p:cNvPr>
@@ -6069,7 +5878,7 @@
           <p:nvPr>
             <p:extLst>
               <p:ext uri="{386F3935-93C4-4BCD-93E2-E3B085C9AB24}">
-                <p16:designElem xmlns:p16="http://schemas.microsoft.com/office/powerpoint/2015/main" xmlns="" val="1"/>
+                <p16:designElem xmlns:p16="http://schemas.microsoft.com/office/powerpoint/2015/main" val="1"/>
               </p:ext>
             </p:extLst>
           </p:nvPr>
@@ -6165,13 +5974,6 @@
   <p:clrMapOvr>
     <a:masterClrMapping/>
   </p:clrMapOvr>
-  <p:timing>
-    <p:tnLst>
-      <p:par>
-        <p:cTn id="1" dur="indefinite" restart="never" nodeType="tmRoot"/>
-      </p:par>
-    </p:tnLst>
-  </p:timing>
 </p:sld>
 </file>
 
@@ -6197,7 +5999,7 @@
           <p:cNvPr id="2" name="Title 1">
             <a:extLst>
               <a:ext uri="{FF2B5EF4-FFF2-40B4-BE49-F238E27FC236}">
-                <a16:creationId xmlns:a16="http://schemas.microsoft.com/office/drawing/2014/main" xmlns="" id="{C7EE6375-9F20-85A5-1A01-014CEFA52FEC}"/>
+                <a16:creationId xmlns:a16="http://schemas.microsoft.com/office/drawing/2014/main" id="{C7EE6375-9F20-85A5-1A01-014CEFA52FEC}"/>
               </a:ext>
             </a:extLst>
           </p:cNvPr>
@@ -6251,7 +6053,7 @@
           <p:cNvPr id="3" name="Content Placeholder 2">
             <a:extLst>
               <a:ext uri="{FF2B5EF4-FFF2-40B4-BE49-F238E27FC236}">
-                <a16:creationId xmlns:a16="http://schemas.microsoft.com/office/drawing/2014/main" xmlns="" id="{DB284742-01CD-8731-ACB4-DCAFF9430FC6}"/>
+                <a16:creationId xmlns:a16="http://schemas.microsoft.com/office/drawing/2014/main" id="{DB284742-01CD-8731-ACB4-DCAFF9430FC6}"/>
               </a:ext>
             </a:extLst>
           </p:cNvPr>
@@ -6314,14 +6116,14 @@
           </a:p>
           <a:p>
             <a:r>
-              <a:rPr lang="en-US" dirty="0" err="1" smtClean="0">
+              <a:rPr lang="en-US" dirty="0" err="1">
                 <a:latin typeface="Times New Roman" panose="02020603050405020304" pitchFamily="18" charset="0"/>
                 <a:cs typeface="Times New Roman" panose="02020603050405020304" pitchFamily="18" charset="0"/>
               </a:rPr>
               <a:t>Phân</a:t>
             </a:r>
             <a:r>
-              <a:rPr lang="en-US" dirty="0" smtClean="0">
+              <a:rPr lang="en-US" dirty="0">
                 <a:latin typeface="Times New Roman" panose="02020603050405020304" pitchFamily="18" charset="0"/>
                 <a:cs typeface="Times New Roman" panose="02020603050405020304" pitchFamily="18" charset="0"/>
               </a:rPr>
@@ -6341,58 +6143,47 @@
               </a:rPr>
               <a:t>: </a:t>
             </a:r>
-            <a:endParaRPr lang="en-US" dirty="0" smtClean="0">
+          </a:p>
+          <a:p>
+            <a:pPr marL="0" indent="0">
+              <a:buNone/>
+            </a:pPr>
+            <a:r>
+              <a:rPr lang="en-US" b="1" dirty="0">
+                <a:latin typeface="Times New Roman" panose="02020603050405020304" pitchFamily="18" charset="0"/>
+                <a:cs typeface="Times New Roman" panose="02020603050405020304" pitchFamily="18" charset="0"/>
+              </a:rPr>
+              <a:t>     Behavior Pattern</a:t>
+            </a:r>
+            <a:endParaRPr lang="en-US" dirty="0">
               <a:latin typeface="Times New Roman" panose="02020603050405020304" pitchFamily="18" charset="0"/>
               <a:cs typeface="Times New Roman" panose="02020603050405020304" pitchFamily="18" charset="0"/>
             </a:endParaRPr>
           </a:p>
           <a:p>
-            <a:pPr marL="0" indent="0">
-              <a:buNone/>
-            </a:pPr>
-            <a:r>
-              <a:rPr lang="en-US" b="1" dirty="0" smtClean="0">
-                <a:latin typeface="Times New Roman" panose="02020603050405020304" pitchFamily="18" charset="0"/>
-                <a:cs typeface="Times New Roman" panose="02020603050405020304" pitchFamily="18" charset="0"/>
-              </a:rPr>
-              <a:t>     </a:t>
-            </a:r>
-            <a:r>
-              <a:rPr lang="en-US" b="1" dirty="0" smtClean="0">
-                <a:latin typeface="Times New Roman" panose="02020603050405020304" pitchFamily="18" charset="0"/>
-                <a:cs typeface="Times New Roman" panose="02020603050405020304" pitchFamily="18" charset="0"/>
-              </a:rPr>
-              <a:t>Behavior Pattern</a:t>
-            </a:r>
-            <a:endParaRPr lang="en-US" dirty="0" smtClean="0">
-              <a:latin typeface="Times New Roman" panose="02020603050405020304" pitchFamily="18" charset="0"/>
-              <a:cs typeface="Times New Roman" panose="02020603050405020304" pitchFamily="18" charset="0"/>
-            </a:endParaRPr>
-          </a:p>
-          <a:p>
-            <a:r>
-              <a:rPr lang="en-US" dirty="0" err="1" smtClean="0">
+            <a:r>
+              <a:rPr lang="en-US" dirty="0" err="1">
                 <a:latin typeface="Times New Roman" panose="02020603050405020304" pitchFamily="18" charset="0"/>
                 <a:cs typeface="Times New Roman" panose="02020603050405020304" pitchFamily="18" charset="0"/>
               </a:rPr>
               <a:t>Mục</a:t>
             </a:r>
             <a:r>
-              <a:rPr lang="en-US" dirty="0" smtClean="0">
+              <a:rPr lang="en-US" dirty="0">
                 <a:latin typeface="Times New Roman" panose="02020603050405020304" pitchFamily="18" charset="0"/>
                 <a:cs typeface="Times New Roman" panose="02020603050405020304" pitchFamily="18" charset="0"/>
               </a:rPr>
               <a:t> </a:t>
             </a:r>
             <a:r>
-              <a:rPr lang="en-US" dirty="0" err="1" smtClean="0">
+              <a:rPr lang="en-US" dirty="0" err="1">
                 <a:latin typeface="Times New Roman" panose="02020603050405020304" pitchFamily="18" charset="0"/>
                 <a:cs typeface="Times New Roman" panose="02020603050405020304" pitchFamily="18" charset="0"/>
               </a:rPr>
               <a:t>đích</a:t>
             </a:r>
             <a:r>
-              <a:rPr lang="en-US" dirty="0" smtClean="0">
+              <a:rPr lang="en-US" dirty="0">
                 <a:latin typeface="Times New Roman" panose="02020603050405020304" pitchFamily="18" charset="0"/>
                 <a:cs typeface="Times New Roman" panose="02020603050405020304" pitchFamily="18" charset="0"/>
               </a:rPr>
@@ -6400,7 +6191,7 @@
             </a:r>
           </a:p>
           <a:p>
-            <a:endParaRPr lang="en-US" dirty="0" smtClean="0">
+            <a:endParaRPr lang="en-US" dirty="0">
               <a:latin typeface="Times New Roman" panose="02020603050405020304" pitchFamily="18" charset="0"/>
               <a:cs typeface="Times New Roman" panose="02020603050405020304" pitchFamily="18" charset="0"/>
             </a:endParaRPr>
@@ -6430,39 +6221,18 @@
           <a:p>
             <a:pPr lvl="1"/>
             <a:r>
-              <a:rPr lang="en-US" sz="2400" dirty="0" smtClean="0">
+              <a:rPr lang="en-US" sz="2400" dirty="0">
                 <a:latin typeface="Times New Roman" pitchFamily="18" charset="0"/>
                 <a:cs typeface="Times New Roman" pitchFamily="18" charset="0"/>
               </a:rPr>
               <a:t>c</a:t>
-            </a:r>
-            <a:r>
-              <a:rPr lang="vi-VN" sz="2400" dirty="0" smtClean="0">
-                <a:latin typeface="Times New Roman" pitchFamily="18" charset="0"/>
-                <a:cs typeface="Times New Roman" pitchFamily="18" charset="0"/>
-              </a:rPr>
-              <a:t>ho </a:t>
             </a:r>
             <a:r>
               <a:rPr lang="vi-VN" sz="2400" dirty="0">
                 <a:latin typeface="Times New Roman" pitchFamily="18" charset="0"/>
                 <a:cs typeface="Times New Roman" pitchFamily="18" charset="0"/>
               </a:rPr>
-              <a:t>phép định nghĩa tập hợp các thuật toán, đóng gói từng thuật toán lại, và dễ dàng thay đổi linh hoạt các thuật toán bên trong object. </a:t>
-            </a:r>
-            <a:r>
-              <a:rPr lang="vi-VN" sz="2400" dirty="0" smtClean="0">
-                <a:latin typeface="Times New Roman" pitchFamily="18" charset="0"/>
-                <a:cs typeface="Times New Roman" pitchFamily="18" charset="0"/>
-              </a:rPr>
-              <a:t>Strategy </a:t>
-            </a:r>
-            <a:r>
-              <a:rPr lang="vi-VN" sz="2400" dirty="0">
-                <a:latin typeface="Times New Roman" pitchFamily="18" charset="0"/>
-                <a:cs typeface="Times New Roman" pitchFamily="18" charset="0"/>
-              </a:rPr>
-              <a:t>cho phép thuật toán biến đổi độc lập khi người dùng sử dụng chúng.</a:t>
+              <a:t>ho phép định nghĩa tập hợp các thuật toán, đóng gói từng thuật toán lại, và dễ dàng thay đổi linh hoạt các thuật toán bên trong object. Strategy cho phép thuật toán biến đổi độc lập khi người dùng sử dụng chúng.</a:t>
             </a:r>
             <a:endParaRPr lang="en-US" sz="2400" dirty="0">
               <a:latin typeface="Times New Roman" pitchFamily="18" charset="0"/>
@@ -6522,13 +6292,6 @@
   <p:clrMapOvr>
     <a:masterClrMapping/>
   </p:clrMapOvr>
-  <p:timing>
-    <p:tnLst>
-      <p:par>
-        <p:cTn id="1" dur="indefinite" restart="never" nodeType="tmRoot"/>
-      </p:par>
-    </p:tnLst>
-  </p:timing>
 </p:sld>
 </file>
 
@@ -6562,7 +6325,7 @@
           <p:cNvPr id="2" name="Title 1">
             <a:extLst>
               <a:ext uri="{FF2B5EF4-FFF2-40B4-BE49-F238E27FC236}">
-                <a16:creationId xmlns:a16="http://schemas.microsoft.com/office/drawing/2014/main" xmlns="" id="{1BA90CC9-741B-0C01-4B44-05CDD430275E}"/>
+                <a16:creationId xmlns:a16="http://schemas.microsoft.com/office/drawing/2014/main" id="{1BA90CC9-741B-0C01-4B44-05CDD430275E}"/>
               </a:ext>
             </a:extLst>
           </p:cNvPr>
@@ -6620,30 +6383,19 @@
               </a:rPr>
               <a:t>Giả sử chúng ta cần xây dựng một app giúp tìm đường đi trong thành phố. Ban đầu app chỉ giúp những người đi bộ tìm đường đi, chúng ta chỉ việc viết thuật toán này ở bất kỳ chỗ nào cần. Nhưng sau này khi yêu cầu tăng lên như phải hỗ trợ thêm việc tìm đường bằng xe hơi, xe đạp,.. Điều này dẫn đến phải thay đổi thuật toán ở những chỗ đã sử dụng, </a:t>
             </a:r>
-            <a:endParaRPr lang="en-US" dirty="0" smtClean="0">
+            <a:endParaRPr lang="en-US" dirty="0">
               <a:latin typeface="Times New Roman" pitchFamily="18" charset="0"/>
               <a:cs typeface="Times New Roman" pitchFamily="18" charset="0"/>
             </a:endParaRPr>
           </a:p>
           <a:p>
             <a:r>
-              <a:rPr lang="vi-VN" dirty="0" smtClean="0">
-                <a:latin typeface="Times New Roman" pitchFamily="18" charset="0"/>
-                <a:cs typeface="Times New Roman" pitchFamily="18" charset="0"/>
-              </a:rPr>
-              <a:t>Điều </a:t>
-            </a:r>
-            <a:r>
               <a:rPr lang="vi-VN" dirty="0">
                 <a:latin typeface="Times New Roman" pitchFamily="18" charset="0"/>
                 <a:cs typeface="Times New Roman" pitchFamily="18" charset="0"/>
               </a:rPr>
-              <a:t>này có thể khiến chương trình trở nên khó maintain và nhiều khi còn gây nên những bug trên những phần đang hoạt động tốt</a:t>
-            </a:r>
-            <a:endParaRPr lang="vi-VN" dirty="0">
-              <a:latin typeface="Times New Roman" pitchFamily="18" charset="0"/>
-              <a:cs typeface="Times New Roman" pitchFamily="18" charset="0"/>
-            </a:endParaRPr>
+              <a:t>Điều này có thể khiến chương trình trở nên khó maintain và nhiều khi còn gây nên những bug trên những phần đang hoạt động tốt</a:t>
+            </a:r>
           </a:p>
         </p:txBody>
       </p:sp>
@@ -6732,13 +6484,6 @@
   <p:clrMapOvr>
     <a:masterClrMapping/>
   </p:clrMapOvr>
-  <p:timing>
-    <p:tnLst>
-      <p:par>
-        <p:cTn id="1" dur="indefinite" restart="never" nodeType="tmRoot"/>
-      </p:par>
-    </p:tnLst>
-  </p:timing>
 </p:sld>
 </file>
 
@@ -6772,7 +6517,7 @@
           <p:cNvPr id="2" name="Title 1">
             <a:extLst>
               <a:ext uri="{FF2B5EF4-FFF2-40B4-BE49-F238E27FC236}">
-                <a16:creationId xmlns:a16="http://schemas.microsoft.com/office/drawing/2014/main" xmlns="" id="{1BA90CC9-741B-0C01-4B44-05CDD430275E}"/>
+                <a16:creationId xmlns:a16="http://schemas.microsoft.com/office/drawing/2014/main" id="{1BA90CC9-741B-0C01-4B44-05CDD430275E}"/>
               </a:ext>
             </a:extLst>
           </p:cNvPr>
@@ -6859,7 +6604,7 @@
         </p:blipFill>
         <p:spPr bwMode="auto">
           <a:xfrm>
-            <a:off x="2707322" y="2255967"/>
+            <a:off x="2595562" y="2254030"/>
             <a:ext cx="7000875" cy="3362326"/>
           </a:xfrm>
           <a:prstGeom prst="rect">
@@ -6887,13 +6632,6 @@
   <p:clrMapOvr>
     <a:masterClrMapping/>
   </p:clrMapOvr>
-  <p:timing>
-    <p:tnLst>
-      <p:par>
-        <p:cTn id="1" dur="indefinite" restart="never" nodeType="tmRoot"/>
-      </p:par>
-    </p:tnLst>
-  </p:timing>
 </p:sld>
 </file>
 
@@ -6919,7 +6657,7 @@
           <p:cNvPr id="2" name="Title 1">
             <a:extLst>
               <a:ext uri="{FF2B5EF4-FFF2-40B4-BE49-F238E27FC236}">
-                <a16:creationId xmlns:a16="http://schemas.microsoft.com/office/drawing/2014/main" xmlns="" id="{F8B3F7B3-5E50-1FF0-9C8B-5B91E3476D2B}"/>
+                <a16:creationId xmlns:a16="http://schemas.microsoft.com/office/drawing/2014/main" id="{F8B3F7B3-5E50-1FF0-9C8B-5B91E3476D2B}"/>
               </a:ext>
             </a:extLst>
           </p:cNvPr>
@@ -6968,7 +6706,7 @@
           <p:cNvPr id="3" name="Content Placeholder 2">
             <a:extLst>
               <a:ext uri="{FF2B5EF4-FFF2-40B4-BE49-F238E27FC236}">
-                <a16:creationId xmlns:a16="http://schemas.microsoft.com/office/drawing/2014/main" xmlns="" id="{0667E26B-C605-1328-71BF-677C3EFB7515}"/>
+                <a16:creationId xmlns:a16="http://schemas.microsoft.com/office/drawing/2014/main" id="{0667E26B-C605-1328-71BF-677C3EFB7515}"/>
               </a:ext>
             </a:extLst>
           </p:cNvPr>
@@ -6998,35 +6736,35 @@
               <a:buNone/>
             </a:pPr>
             <a:r>
-              <a:rPr lang="en-US" sz="2400" dirty="0" err="1" smtClean="0">
+              <a:rPr lang="en-US" sz="2400" dirty="0" err="1">
                 <a:latin typeface="Times New Roman" panose="02020603050405020304" pitchFamily="18" charset="0"/>
                 <a:cs typeface="Times New Roman" panose="02020603050405020304" pitchFamily="18" charset="0"/>
               </a:rPr>
               <a:t>Cấu</a:t>
             </a:r>
             <a:r>
-              <a:rPr lang="en-US" sz="2400" dirty="0" smtClean="0">
+              <a:rPr lang="en-US" sz="2400" dirty="0">
                 <a:latin typeface="Times New Roman" panose="02020603050405020304" pitchFamily="18" charset="0"/>
                 <a:cs typeface="Times New Roman" panose="02020603050405020304" pitchFamily="18" charset="0"/>
               </a:rPr>
               <a:t> </a:t>
             </a:r>
             <a:r>
-              <a:rPr lang="en-US" sz="2400" dirty="0" err="1" smtClean="0">
+              <a:rPr lang="en-US" sz="2400" dirty="0" err="1">
                 <a:latin typeface="Times New Roman" panose="02020603050405020304" pitchFamily="18" charset="0"/>
                 <a:cs typeface="Times New Roman" panose="02020603050405020304" pitchFamily="18" charset="0"/>
               </a:rPr>
               <a:t>trúc</a:t>
             </a:r>
             <a:r>
-              <a:rPr lang="en-US" sz="2400" dirty="0" smtClean="0">
+              <a:rPr lang="en-US" sz="2400" dirty="0">
                 <a:latin typeface="Times New Roman" panose="02020603050405020304" pitchFamily="18" charset="0"/>
                 <a:cs typeface="Times New Roman" panose="02020603050405020304" pitchFamily="18" charset="0"/>
               </a:rPr>
               <a:t> </a:t>
             </a:r>
             <a:r>
-              <a:rPr lang="en-US" sz="2400" dirty="0" err="1" smtClean="0">
+              <a:rPr lang="en-US" sz="2400" dirty="0" err="1">
                 <a:latin typeface="Times New Roman" panose="02020603050405020304" pitchFamily="18" charset="0"/>
                 <a:cs typeface="Times New Roman" panose="02020603050405020304" pitchFamily="18" charset="0"/>
               </a:rPr>
@@ -7039,10 +6777,6 @@
               </a:rPr>
               <a:t>:</a:t>
             </a:r>
-            <a:endParaRPr lang="en-US" sz="2400" dirty="0" smtClean="0">
-              <a:latin typeface="Times New Roman" panose="02020603050405020304" pitchFamily="18" charset="0"/>
-              <a:cs typeface="Times New Roman" panose="02020603050405020304" pitchFamily="18" charset="0"/>
-            </a:endParaRPr>
           </a:p>
         </p:txBody>
       </p:sp>
@@ -7097,13 +6831,6 @@
   <p:clrMapOvr>
     <a:masterClrMapping/>
   </p:clrMapOvr>
-  <p:timing>
-    <p:tnLst>
-      <p:par>
-        <p:cTn id="1" dur="indefinite" restart="never" nodeType="tmRoot"/>
-      </p:par>
-    </p:tnLst>
-  </p:timing>
 </p:sld>
 </file>
 
@@ -7129,7 +6856,7 @@
           <p:cNvPr id="2" name="Title 1">
             <a:extLst>
               <a:ext uri="{FF2B5EF4-FFF2-40B4-BE49-F238E27FC236}">
-                <a16:creationId xmlns:a16="http://schemas.microsoft.com/office/drawing/2014/main" xmlns="" id="{F8B3F7B3-5E50-1FF0-9C8B-5B91E3476D2B}"/>
+                <a16:creationId xmlns:a16="http://schemas.microsoft.com/office/drawing/2014/main" id="{F8B3F7B3-5E50-1FF0-9C8B-5B91E3476D2B}"/>
               </a:ext>
             </a:extLst>
           </p:cNvPr>
@@ -7178,7 +6905,7 @@
           <p:cNvPr id="3" name="Content Placeholder 2">
             <a:extLst>
               <a:ext uri="{FF2B5EF4-FFF2-40B4-BE49-F238E27FC236}">
-                <a16:creationId xmlns:a16="http://schemas.microsoft.com/office/drawing/2014/main" xmlns="" id="{0667E26B-C605-1328-71BF-677C3EFB7515}"/>
+                <a16:creationId xmlns:a16="http://schemas.microsoft.com/office/drawing/2014/main" id="{0667E26B-C605-1328-71BF-677C3EFB7515}"/>
               </a:ext>
             </a:extLst>
           </p:cNvPr>
@@ -7254,7 +6981,7 @@
               </a:rPr>
               <a:t>Class sử dụng các strategy object và chỉ giao tiếp với các strategy object thông qua interface </a:t>
             </a:r>
-            <a:endParaRPr lang="en-US" sz="2400" dirty="0" smtClean="0">
+            <a:endParaRPr lang="en-US" sz="2400" dirty="0">
               <a:latin typeface="Times New Roman" pitchFamily="18" charset="0"/>
               <a:cs typeface="Times New Roman" pitchFamily="18" charset="0"/>
             </a:endParaRPr>
@@ -7265,18 +6992,11 @@
               <a:buAutoNum type="arabicPeriod"/>
             </a:pPr>
             <a:r>
-              <a:rPr lang="vi-VN" sz="2400" b="1" dirty="0" smtClean="0">
-                <a:latin typeface="Times New Roman" pitchFamily="18" charset="0"/>
-                <a:cs typeface="Times New Roman" pitchFamily="18" charset="0"/>
-              </a:rPr>
-              <a:t>Strategy</a:t>
-            </a:r>
-            <a:r>
               <a:rPr lang="vi-VN" sz="2400" b="1" dirty="0">
                 <a:latin typeface="Times New Roman" pitchFamily="18" charset="0"/>
                 <a:cs typeface="Times New Roman" pitchFamily="18" charset="0"/>
               </a:rPr>
-              <a:t>: </a:t>
+              <a:t>Strategy: </a:t>
             </a:r>
             <a:r>
               <a:rPr lang="vi-VN" sz="2400" dirty="0">
@@ -7285,7 +7005,7 @@
               </a:rPr>
               <a:t>Cung cấp một interface chung cho context giao tiếp với các strategy object </a:t>
             </a:r>
-            <a:endParaRPr lang="en-US" sz="2400" dirty="0" smtClean="0">
+            <a:endParaRPr lang="en-US" sz="2400" dirty="0">
               <a:latin typeface="Times New Roman" pitchFamily="18" charset="0"/>
               <a:cs typeface="Times New Roman" pitchFamily="18" charset="0"/>
             </a:endParaRPr>
@@ -7296,18 +7016,11 @@
               <a:buAutoNum type="arabicPeriod"/>
             </a:pPr>
             <a:r>
-              <a:rPr lang="vi-VN" sz="2400" b="1" dirty="0" smtClean="0">
-                <a:latin typeface="Times New Roman" pitchFamily="18" charset="0"/>
-                <a:cs typeface="Times New Roman" pitchFamily="18" charset="0"/>
-              </a:rPr>
-              <a:t>Concrete </a:t>
-            </a:r>
-            <a:r>
               <a:rPr lang="vi-VN" sz="2400" b="1" dirty="0">
                 <a:latin typeface="Times New Roman" pitchFamily="18" charset="0"/>
                 <a:cs typeface="Times New Roman" pitchFamily="18" charset="0"/>
               </a:rPr>
-              <a:t>Strategy:</a:t>
+              <a:t>Concrete Strategy:</a:t>
             </a:r>
             <a:r>
               <a:rPr lang="vi-VN" sz="2400" dirty="0">
@@ -7316,7 +7029,7 @@
               </a:rPr>
               <a:t> Implement các thuật toán khác nhau cho context sử dụng </a:t>
             </a:r>
-            <a:endParaRPr lang="en-US" sz="2400" dirty="0" smtClean="0">
+            <a:endParaRPr lang="en-US" sz="2400" dirty="0">
               <a:latin typeface="Times New Roman" pitchFamily="18" charset="0"/>
               <a:cs typeface="Times New Roman" pitchFamily="18" charset="0"/>
             </a:endParaRPr>
@@ -7327,7 +7040,7 @@
               <a:buAutoNum type="arabicPeriod"/>
             </a:pPr>
             <a:r>
-              <a:rPr lang="vi-VN" sz="2400" b="1" dirty="0" smtClean="0">
+              <a:rPr lang="vi-VN" sz="2400" b="1" dirty="0">
                 <a:latin typeface="Times New Roman" pitchFamily="18" charset="0"/>
                 <a:cs typeface="Times New Roman" pitchFamily="18" charset="0"/>
               </a:rPr>
@@ -7340,10 +7053,6 @@
               </a:rPr>
               <a:t>: Có trách nhiệm tạo ra các strategy object và truyền vào cho context sử dụng</a:t>
             </a:r>
-            <a:endParaRPr lang="vi-VN" sz="2400" dirty="0">
-              <a:latin typeface="Times New Roman" pitchFamily="18" charset="0"/>
-              <a:cs typeface="Times New Roman" pitchFamily="18" charset="0"/>
-            </a:endParaRPr>
           </a:p>
         </p:txBody>
       </p:sp>
@@ -7357,13 +7066,6 @@
   <p:clrMapOvr>
     <a:masterClrMapping/>
   </p:clrMapOvr>
-  <p:timing>
-    <p:tnLst>
-      <p:par>
-        <p:cTn id="1" dur="indefinite" restart="never" nodeType="tmRoot"/>
-      </p:par>
-    </p:tnLst>
-  </p:timing>
 </p:sld>
 </file>
 
@@ -7389,7 +7091,7 @@
           <p:cNvPr id="2" name="Title 1">
             <a:extLst>
               <a:ext uri="{FF2B5EF4-FFF2-40B4-BE49-F238E27FC236}">
-                <a16:creationId xmlns:a16="http://schemas.microsoft.com/office/drawing/2014/main" xmlns="" id="{2DAC8EB1-8C33-6B02-3A6F-F14974F7C149}"/>
+                <a16:creationId xmlns:a16="http://schemas.microsoft.com/office/drawing/2014/main" id="{2DAC8EB1-8C33-6B02-3A6F-F14974F7C149}"/>
               </a:ext>
             </a:extLst>
           </p:cNvPr>
@@ -7471,7 +7173,7 @@
           <p:cNvPr id="3" name="Content Placeholder 2">
             <a:extLst>
               <a:ext uri="{FF2B5EF4-FFF2-40B4-BE49-F238E27FC236}">
-                <a16:creationId xmlns:a16="http://schemas.microsoft.com/office/drawing/2014/main" xmlns="" id="{1C3B16E3-16E1-EB55-86F0-900C395FF75E}"/>
+                <a16:creationId xmlns:a16="http://schemas.microsoft.com/office/drawing/2014/main" id="{1C3B16E3-16E1-EB55-86F0-900C395FF75E}"/>
               </a:ext>
             </a:extLst>
           </p:cNvPr>
@@ -7504,21 +7206,21 @@
               <a:buNone/>
             </a:pPr>
             <a:r>
-              <a:rPr lang="en-US" dirty="0" smtClean="0">
+              <a:rPr lang="en-US" dirty="0">
                 <a:latin typeface="Times New Roman" panose="02020603050405020304" pitchFamily="18" charset="0"/>
                 <a:cs typeface="Times New Roman" panose="02020603050405020304" pitchFamily="18" charset="0"/>
               </a:rPr>
               <a:t>     </a:t>
             </a:r>
             <a:r>
-              <a:rPr lang="en-US" b="1" dirty="0" err="1" smtClean="0">
+              <a:rPr lang="en-US" b="1" dirty="0" err="1">
                 <a:latin typeface="Times New Roman" panose="02020603050405020304" pitchFamily="18" charset="0"/>
                 <a:cs typeface="Times New Roman" panose="02020603050405020304" pitchFamily="18" charset="0"/>
               </a:rPr>
               <a:t>Ưu</a:t>
             </a:r>
             <a:r>
-              <a:rPr lang="en-US" b="1" dirty="0" smtClean="0">
+              <a:rPr lang="en-US" b="1" dirty="0">
                 <a:latin typeface="Times New Roman" panose="02020603050405020304" pitchFamily="18" charset="0"/>
                 <a:cs typeface="Times New Roman" panose="02020603050405020304" pitchFamily="18" charset="0"/>
               </a:rPr>
@@ -7548,7 +7250,7 @@
               </a:rPr>
               <a:t>Có thể thay thế các thuật toán linh hoạt với nhau </a:t>
             </a:r>
-            <a:endParaRPr lang="en-US" dirty="0" smtClean="0">
+            <a:endParaRPr lang="en-US" dirty="0">
               <a:latin typeface="Times New Roman" pitchFamily="18" charset="0"/>
               <a:cs typeface="Times New Roman" pitchFamily="18" charset="0"/>
             </a:endParaRPr>
@@ -7556,20 +7258,13 @@
           <a:p>
             <a:pPr lvl="1"/>
             <a:r>
-              <a:rPr lang="vi-VN" dirty="0" smtClean="0">
-                <a:latin typeface="Times New Roman" pitchFamily="18" charset="0"/>
-                <a:cs typeface="Times New Roman" pitchFamily="18" charset="0"/>
-              </a:rPr>
-              <a:t>Tách </a:t>
-            </a:r>
-            <a:r>
               <a:rPr lang="vi-VN" dirty="0">
                 <a:latin typeface="Times New Roman" pitchFamily="18" charset="0"/>
                 <a:cs typeface="Times New Roman" pitchFamily="18" charset="0"/>
               </a:rPr>
-              <a:t>biệt phần thuật toán khỏi phần sử dụng thuật toán </a:t>
-            </a:r>
-            <a:endParaRPr lang="en-US" dirty="0" smtClean="0">
+              <a:t>Tách biệt phần thuật toán khỏi phần sử dụng thuật toán </a:t>
+            </a:r>
+            <a:endParaRPr lang="en-US" dirty="0">
               <a:latin typeface="Times New Roman" pitchFamily="18" charset="0"/>
               <a:cs typeface="Times New Roman" pitchFamily="18" charset="0"/>
             </a:endParaRPr>
@@ -7577,20 +7272,13 @@
           <a:p>
             <a:pPr lvl="1"/>
             <a:r>
-              <a:rPr lang="vi-VN" dirty="0" smtClean="0">
-                <a:latin typeface="Times New Roman" pitchFamily="18" charset="0"/>
-                <a:cs typeface="Times New Roman" pitchFamily="18" charset="0"/>
-              </a:rPr>
-              <a:t>Có </a:t>
-            </a:r>
-            <a:r>
               <a:rPr lang="vi-VN" dirty="0">
                 <a:latin typeface="Times New Roman" pitchFamily="18" charset="0"/>
                 <a:cs typeface="Times New Roman" pitchFamily="18" charset="0"/>
               </a:rPr>
-              <a:t>thể thay thế việc kế thừa bằng việc encapsulate thuật toán </a:t>
-            </a:r>
-            <a:endParaRPr lang="en-US" dirty="0" smtClean="0">
+              <a:t>Có thể thay thế việc kế thừa bằng việc encapsulate thuật toán </a:t>
+            </a:r>
+            <a:endParaRPr lang="en-US" dirty="0">
               <a:latin typeface="Times New Roman" pitchFamily="18" charset="0"/>
               <a:cs typeface="Times New Roman" pitchFamily="18" charset="0"/>
             </a:endParaRPr>
@@ -7651,37 +7339,16 @@
                 <a:latin typeface="Times New Roman" pitchFamily="18" charset="0"/>
                 <a:cs typeface="Times New Roman" pitchFamily="18" charset="0"/>
               </a:rPr>
-              <a:t> Open/Closed </a:t>
-            </a:r>
-            <a:r>
-              <a:rPr lang="en-US" dirty="0" smtClean="0">
-                <a:latin typeface="Times New Roman" pitchFamily="18" charset="0"/>
-                <a:cs typeface="Times New Roman" pitchFamily="18" charset="0"/>
-              </a:rPr>
-              <a:t>Principle</a:t>
-            </a:r>
-            <a:r>
-              <a:rPr lang="vi-VN" dirty="0" smtClean="0">
-                <a:latin typeface="Times New Roman" pitchFamily="18" charset="0"/>
-                <a:cs typeface="Times New Roman" pitchFamily="18" charset="0"/>
-              </a:rPr>
-              <a:t>: </a:t>
+              <a:t> Open/Closed Principle</a:t>
             </a:r>
             <a:r>
               <a:rPr lang="vi-VN" dirty="0">
                 <a:latin typeface="Times New Roman" pitchFamily="18" charset="0"/>
                 <a:cs typeface="Times New Roman" pitchFamily="18" charset="0"/>
               </a:rPr>
-              <a:t>chúng ta dễ dàng mở rộng và kết hợp hành vi mới mà không thay đổi ứng dụng</a:t>
-            </a:r>
-            <a:r>
-              <a:rPr lang="vi-VN" dirty="0" smtClean="0">
-                <a:latin typeface="Times New Roman" pitchFamily="18" charset="0"/>
-                <a:cs typeface="Times New Roman" pitchFamily="18" charset="0"/>
-              </a:rPr>
-              <a:t>.</a:t>
-            </a:r>
-            <a:endParaRPr lang="en-US" dirty="0" smtClean="0">
+              <a:t>: chúng ta dễ dàng mở rộng và kết hợp hành vi mới mà không thay đổi ứng dụng.</a:t>
+            </a:r>
+            <a:endParaRPr lang="en-US" dirty="0">
               <a:latin typeface="Times New Roman" pitchFamily="18" charset="0"/>
               <a:cs typeface="Times New Roman" pitchFamily="18" charset="0"/>
             </a:endParaRPr>
@@ -7690,7 +7357,7 @@
             <a:pPr marL="457200" lvl="1" indent="0">
               <a:buNone/>
             </a:pPr>
-            <a:endParaRPr lang="en-US" sz="2800" b="1" dirty="0" smtClean="0">
+            <a:endParaRPr lang="en-US" sz="2800" b="1" dirty="0">
               <a:latin typeface="Times New Roman" panose="02020603050405020304" pitchFamily="18" charset="0"/>
               <a:cs typeface="Times New Roman" panose="02020603050405020304" pitchFamily="18" charset="0"/>
             </a:endParaRPr>
@@ -7700,20 +7367,13 @@
               <a:buNone/>
             </a:pPr>
             <a:r>
-              <a:rPr lang="vi-VN" sz="2800" b="1" dirty="0" smtClean="0">
-                <a:latin typeface="Times New Roman" panose="02020603050405020304" pitchFamily="18" charset="0"/>
-                <a:cs typeface="Times New Roman" panose="02020603050405020304" pitchFamily="18" charset="0"/>
-              </a:rPr>
-              <a:t>Nhược </a:t>
-            </a:r>
-            <a:r>
               <a:rPr lang="vi-VN" sz="2800" b="1" dirty="0">
                 <a:latin typeface="Times New Roman" panose="02020603050405020304" pitchFamily="18" charset="0"/>
                 <a:cs typeface="Times New Roman" panose="02020603050405020304" pitchFamily="18" charset="0"/>
               </a:rPr>
-              <a:t>điểm </a:t>
-            </a:r>
-            <a:endParaRPr lang="en-US" sz="2800" b="1" dirty="0" smtClean="0">
+              <a:t>Nhược điểm </a:t>
+            </a:r>
+            <a:endParaRPr lang="en-US" sz="2800" b="1" dirty="0">
               <a:latin typeface="Times New Roman" panose="02020603050405020304" pitchFamily="18" charset="0"/>
               <a:cs typeface="Times New Roman" panose="02020603050405020304" pitchFamily="18" charset="0"/>
             </a:endParaRPr>
@@ -7734,7 +7394,7 @@
               </a:rPr>
               <a:t>Không nên áp dụng nếu chỉ có một vài xử lý và hiếm khi thay đổi. </a:t>
             </a:r>
-            <a:endParaRPr lang="en-US" dirty="0" smtClean="0">
+            <a:endParaRPr lang="en-US" dirty="0">
               <a:latin typeface="Times New Roman" panose="02020603050405020304" pitchFamily="18" charset="0"/>
               <a:cs typeface="Times New Roman" panose="02020603050405020304" pitchFamily="18" charset="0"/>
             </a:endParaRPr>
@@ -7749,18 +7409,11 @@
               </a:spcAft>
             </a:pPr>
             <a:r>
-              <a:rPr lang="vi-VN" dirty="0" smtClean="0">
-                <a:latin typeface="Times New Roman" panose="02020603050405020304" pitchFamily="18" charset="0"/>
-                <a:cs typeface="Times New Roman" panose="02020603050405020304" pitchFamily="18" charset="0"/>
-              </a:rPr>
-              <a:t>Client </a:t>
-            </a:r>
-            <a:r>
               <a:rPr lang="vi-VN" dirty="0">
                 <a:latin typeface="Times New Roman" panose="02020603050405020304" pitchFamily="18" charset="0"/>
                 <a:cs typeface="Times New Roman" panose="02020603050405020304" pitchFamily="18" charset="0"/>
               </a:rPr>
-              <a:t>phải nhận biết được sự khác biệt giữa các strategy.</a:t>
+              <a:t>Client phải nhận biết được sự khác biệt giữa các strategy.</a:t>
             </a:r>
             <a:endParaRPr lang="en-US" dirty="0">
               <a:latin typeface="Times New Roman" panose="02020603050405020304" pitchFamily="18" charset="0"/>
@@ -7779,13 +7432,6 @@
   <p:clrMapOvr>
     <a:masterClrMapping/>
   </p:clrMapOvr>
-  <p:timing>
-    <p:tnLst>
-      <p:par>
-        <p:cTn id="1" dur="indefinite" restart="never" nodeType="tmRoot"/>
-      </p:par>
-    </p:tnLst>
-  </p:timing>
 </p:sld>
 </file>
 
@@ -7819,10 +7465,10 @@
           <p:cNvPr id="14" name="Rectangle 13">
             <a:extLst>
               <a:ext uri="{FF2B5EF4-FFF2-40B4-BE49-F238E27FC236}">
-                <a16:creationId xmlns:a16="http://schemas.microsoft.com/office/drawing/2014/main" xmlns="" id="{743AA782-23D1-4521-8CAD-47662984AA08}"/>
+                <a16:creationId xmlns:a16="http://schemas.microsoft.com/office/drawing/2014/main" id="{743AA782-23D1-4521-8CAD-47662984AA08}"/>
               </a:ext>
               <a:ext uri="{C183D7F6-B498-43B3-948B-1728B52AA6E4}">
-                <adec:decorative xmlns:adec="http://schemas.microsoft.com/office/drawing/2017/decorative" xmlns="" val="1"/>
+                <adec:decorative xmlns:adec="http://schemas.microsoft.com/office/drawing/2017/decorative" val="1"/>
               </a:ext>
             </a:extLst>
           </p:cNvPr>
@@ -7832,7 +7478,7 @@
           <p:nvPr>
             <p:extLst>
               <p:ext uri="{386F3935-93C4-4BCD-93E2-E3B085C9AB24}">
-                <p16:designElem xmlns:p16="http://schemas.microsoft.com/office/powerpoint/2015/main" xmlns="" val="1"/>
+                <p16:designElem xmlns:p16="http://schemas.microsoft.com/office/powerpoint/2015/main" val="1"/>
               </p:ext>
             </p:extLst>
           </p:nvPr>
@@ -7896,70 +7542,56 @@
           <a:lstStyle/>
           <a:p>
             <a:r>
-              <a:rPr lang="en-US" sz="4000" dirty="0" err="1" smtClean="0">
+              <a:rPr lang="en-US" sz="4000" dirty="0" err="1">
                 <a:latin typeface="Times New Roman" pitchFamily="18" charset="0"/>
                 <a:cs typeface="Times New Roman" pitchFamily="18" charset="0"/>
               </a:rPr>
               <a:t>Sử</a:t>
             </a:r>
             <a:r>
-              <a:rPr lang="en-US" sz="4000" dirty="0" smtClean="0">
+              <a:rPr lang="en-US" sz="4000" dirty="0">
                 <a:latin typeface="Times New Roman" pitchFamily="18" charset="0"/>
                 <a:cs typeface="Times New Roman" pitchFamily="18" charset="0"/>
               </a:rPr>
               <a:t> </a:t>
             </a:r>
             <a:r>
-              <a:rPr lang="en-US" sz="4000" dirty="0" err="1" smtClean="0">
+              <a:rPr lang="en-US" sz="4000" dirty="0" err="1">
                 <a:latin typeface="Times New Roman" pitchFamily="18" charset="0"/>
                 <a:cs typeface="Times New Roman" pitchFamily="18" charset="0"/>
               </a:rPr>
               <a:t>dụng</a:t>
             </a:r>
             <a:r>
-              <a:rPr lang="en-US" sz="4000" dirty="0" smtClean="0">
+              <a:rPr lang="en-US" sz="4000" dirty="0">
                 <a:latin typeface="Times New Roman" pitchFamily="18" charset="0"/>
                 <a:cs typeface="Times New Roman" pitchFamily="18" charset="0"/>
               </a:rPr>
-              <a:t> </a:t>
-            </a:r>
-            <a:r>
-              <a:rPr lang="en-US" sz="4000" dirty="0" smtClean="0">
+              <a:t> Strategy pattern </a:t>
+            </a:r>
+            <a:r>
+              <a:rPr lang="en-US" sz="4000" dirty="0" err="1">
                 <a:latin typeface="Times New Roman" pitchFamily="18" charset="0"/>
                 <a:cs typeface="Times New Roman" pitchFamily="18" charset="0"/>
               </a:rPr>
-              <a:t>Strategy </a:t>
-            </a:r>
-            <a:r>
-              <a:rPr lang="en-US" sz="4000" dirty="0" smtClean="0">
+              <a:t>khi</a:t>
+            </a:r>
+            <a:r>
+              <a:rPr lang="en-US" sz="4000" dirty="0">
                 <a:latin typeface="Times New Roman" pitchFamily="18" charset="0"/>
                 <a:cs typeface="Times New Roman" pitchFamily="18" charset="0"/>
               </a:rPr>
-              <a:t>pattern </a:t>
-            </a:r>
-            <a:r>
-              <a:rPr lang="en-US" sz="4000" dirty="0" err="1" smtClean="0">
+              <a:t> </a:t>
+            </a:r>
+            <a:r>
+              <a:rPr lang="en-US" sz="4000" dirty="0" err="1">
                 <a:latin typeface="Times New Roman" pitchFamily="18" charset="0"/>
                 <a:cs typeface="Times New Roman" pitchFamily="18" charset="0"/>
               </a:rPr>
-              <a:t>khi</a:t>
-            </a:r>
-            <a:r>
-              <a:rPr lang="en-US" sz="4000" dirty="0" smtClean="0">
-                <a:latin typeface="Times New Roman" pitchFamily="18" charset="0"/>
-                <a:cs typeface="Times New Roman" pitchFamily="18" charset="0"/>
-              </a:rPr>
-              <a:t> </a:t>
-            </a:r>
-            <a:r>
-              <a:rPr lang="en-US" sz="4000" dirty="0" err="1" smtClean="0">
-                <a:latin typeface="Times New Roman" pitchFamily="18" charset="0"/>
-                <a:cs typeface="Times New Roman" pitchFamily="18" charset="0"/>
-              </a:rPr>
               <a:t>nào</a:t>
             </a:r>
             <a:r>
-              <a:rPr lang="en-US" sz="4000" dirty="0" smtClean="0">
+              <a:rPr lang="en-US" sz="4000" dirty="0">
                 <a:latin typeface="Times New Roman" pitchFamily="18" charset="0"/>
                 <a:cs typeface="Times New Roman" pitchFamily="18" charset="0"/>
               </a:rPr>
@@ -7971,7 +7603,7 @@
               <a:buFont typeface="Courier New" pitchFamily="49" charset="0"/>
               <a:buChar char="o"/>
             </a:pPr>
-            <a:endParaRPr lang="en-US" sz="2000" dirty="0" smtClean="0">
+            <a:endParaRPr lang="en-US" sz="2000" dirty="0">
               <a:latin typeface="Times New Roman" pitchFamily="18" charset="0"/>
               <a:cs typeface="Times New Roman" pitchFamily="18" charset="0"/>
             </a:endParaRPr>
@@ -7992,20 +7624,13 @@
               <a:buChar char="o"/>
             </a:pPr>
             <a:r>
-              <a:rPr lang="vi-VN" sz="2400" dirty="0" smtClean="0">
-                <a:latin typeface="Times New Roman" pitchFamily="18" charset="0"/>
-                <a:cs typeface="Times New Roman" pitchFamily="18" charset="0"/>
-              </a:rPr>
-              <a:t>Khi </a:t>
-            </a:r>
-            <a:r>
               <a:rPr lang="vi-VN" sz="2400" dirty="0">
                 <a:latin typeface="Times New Roman" pitchFamily="18" charset="0"/>
                 <a:cs typeface="Times New Roman" pitchFamily="18" charset="0"/>
               </a:rPr>
-              <a:t>muốn có thể thay đổi các thuật toán được sử dụng bên trong một đối tượng tại thời điểm run-time. </a:t>
-            </a:r>
-            <a:endParaRPr lang="en-US" sz="2400" dirty="0" smtClean="0">
+              <a:t>Khi muốn có thể thay đổi các thuật toán được sử dụng bên trong một đối tượng tại thời điểm run-time. </a:t>
+            </a:r>
+            <a:endParaRPr lang="en-US" sz="2400" dirty="0">
               <a:latin typeface="Times New Roman" pitchFamily="18" charset="0"/>
               <a:cs typeface="Times New Roman" pitchFamily="18" charset="0"/>
             </a:endParaRPr>
@@ -8023,27 +7648,13 @@
               <a:buChar char="o"/>
             </a:pPr>
             <a:r>
-              <a:rPr lang="vi-VN" sz="2400" dirty="0" smtClean="0">
-                <a:latin typeface="Times New Roman" pitchFamily="18" charset="0"/>
-                <a:cs typeface="Times New Roman" pitchFamily="18" charset="0"/>
-              </a:rPr>
-              <a:t>Khi </a:t>
-            </a:r>
-            <a:r>
               <a:rPr lang="vi-VN" sz="2400" dirty="0">
                 <a:latin typeface="Times New Roman" pitchFamily="18" charset="0"/>
                 <a:cs typeface="Times New Roman" pitchFamily="18" charset="0"/>
               </a:rPr>
-              <a:t>có nhiều lớp tương đương chỉ khác cách chúng thực thi một vài hành vi</a:t>
-            </a:r>
-            <a:r>
-              <a:rPr lang="vi-VN" sz="2400" dirty="0" smtClean="0">
-                <a:latin typeface="Times New Roman" pitchFamily="18" charset="0"/>
-                <a:cs typeface="Times New Roman" pitchFamily="18" charset="0"/>
-              </a:rPr>
-              <a:t>.</a:t>
-            </a:r>
-            <a:endParaRPr lang="en-US" sz="2400" dirty="0" smtClean="0">
+              <a:t>Khi có nhiều lớp tương đương chỉ khác cách chúng thực thi một vài hành vi.</a:t>
+            </a:r>
+            <a:endParaRPr lang="en-US" sz="2400" dirty="0">
               <a:latin typeface="Times New Roman" pitchFamily="18" charset="0"/>
               <a:cs typeface="Times New Roman" pitchFamily="18" charset="0"/>
             </a:endParaRPr>
@@ -8051,13 +7662,13 @@
           <a:p>
             <a:pPr lvl="1"/>
             <a:r>
-              <a:rPr lang="vi-VN" sz="2400" dirty="0" smtClean="0">
+              <a:rPr lang="vi-VN" sz="2400" dirty="0">
                 <a:latin typeface="Times New Roman" pitchFamily="18" charset="0"/>
                 <a:cs typeface="Times New Roman" pitchFamily="18" charset="0"/>
               </a:rPr>
               <a:t> </a:t>
             </a:r>
-            <a:endParaRPr lang="en-US" sz="2400" dirty="0" smtClean="0">
+            <a:endParaRPr lang="en-US" sz="2400" dirty="0">
               <a:latin typeface="Times New Roman" pitchFamily="18" charset="0"/>
               <a:cs typeface="Times New Roman" pitchFamily="18" charset="0"/>
             </a:endParaRPr>
@@ -8068,27 +7679,20 @@
               <a:buChar char="o"/>
             </a:pPr>
             <a:r>
-              <a:rPr lang="vi-VN" sz="2400" dirty="0" smtClean="0">
-                <a:latin typeface="Times New Roman" pitchFamily="18" charset="0"/>
-                <a:cs typeface="Times New Roman" pitchFamily="18" charset="0"/>
-              </a:rPr>
-              <a:t>Khi </a:t>
-            </a:r>
-            <a:r>
               <a:rPr lang="vi-VN" sz="2400" dirty="0">
                 <a:latin typeface="Times New Roman" pitchFamily="18" charset="0"/>
                 <a:cs typeface="Times New Roman" pitchFamily="18" charset="0"/>
               </a:rPr>
-              <a:t>muốn tách biệt business logic của một lớp khỏi implementation details của các xử lý. </a:t>
-            </a:r>
-            <a:endParaRPr lang="en-US" sz="2400" dirty="0" smtClean="0">
+              <a:t>Khi muốn tách biệt business logic của một lớp khỏi implementation details của các xử lý. </a:t>
+            </a:r>
+            <a:endParaRPr lang="en-US" sz="2400" dirty="0">
               <a:latin typeface="Times New Roman" pitchFamily="18" charset="0"/>
               <a:cs typeface="Times New Roman" pitchFamily="18" charset="0"/>
             </a:endParaRPr>
           </a:p>
           <a:p>
             <a:pPr lvl="1"/>
-            <a:endParaRPr lang="en-US" sz="2400" dirty="0" smtClean="0">
+            <a:endParaRPr lang="en-US" sz="2400" dirty="0">
               <a:latin typeface="Times New Roman" pitchFamily="18" charset="0"/>
               <a:cs typeface="Times New Roman" pitchFamily="18" charset="0"/>
             </a:endParaRPr>
@@ -8099,20 +7703,13 @@
               <a:buChar char="o"/>
             </a:pPr>
             <a:r>
-              <a:rPr lang="vi-VN" sz="2400" dirty="0" smtClean="0">
-                <a:latin typeface="Times New Roman" pitchFamily="18" charset="0"/>
-                <a:cs typeface="Times New Roman" pitchFamily="18" charset="0"/>
-              </a:rPr>
-              <a:t>Khi </a:t>
-            </a:r>
-            <a:r>
               <a:rPr lang="vi-VN" sz="2400" dirty="0">
                 <a:latin typeface="Times New Roman" pitchFamily="18" charset="0"/>
                 <a:cs typeface="Times New Roman" pitchFamily="18" charset="0"/>
               </a:rPr>
-              <a:t>lớp có toán tử điều kiện lớn chuyển đổi giữa các biến thể của cùng một xử lý.</a:t>
-            </a:r>
-            <a:endParaRPr lang="en-US" sz="2400" dirty="0" smtClean="0">
+              <a:t>Khi lớp có toán tử điều kiện lớn chuyển đổi giữa các biến thể của cùng một xử lý.</a:t>
+            </a:r>
+            <a:endParaRPr lang="en-US" sz="2400" dirty="0">
               <a:latin typeface="Times New Roman" pitchFamily="18" charset="0"/>
               <a:cs typeface="Times New Roman" pitchFamily="18" charset="0"/>
             </a:endParaRPr>
@@ -8129,13 +7726,6 @@
   <p:clrMapOvr>
     <a:masterClrMapping/>
   </p:clrMapOvr>
-  <p:timing>
-    <p:tnLst>
-      <p:par>
-        <p:cTn id="1" dur="indefinite" restart="never" nodeType="tmRoot"/>
-      </p:par>
-    </p:tnLst>
-  </p:timing>
 </p:sld>
 </file>
 
@@ -8448,7 +8038,7 @@
   <a:extraClrSchemeLst/>
   <a:extLst>
     <a:ext uri="{05A4C25C-085E-4340-85A3-A5531E510DB2}">
-      <thm15:themeFamily xmlns:thm15="http://schemas.microsoft.com/office/thememl/2012/main" xmlns="" name="Office Theme" id="{2E142A2C-CD16-42D6-873A-C26D2A0506FA}" vid="{1BDDFF52-6CD6-40A5-AB3C-68EB2F1E4D0A}"/>
+      <thm15:themeFamily xmlns:thm15="http://schemas.microsoft.com/office/thememl/2012/main" name="Office Theme" id="{2E142A2C-CD16-42D6-873A-C26D2A0506FA}" vid="{1BDDFF52-6CD6-40A5-AB3C-68EB2F1E4D0A}"/>
     </a:ext>
   </a:extLst>
 </a:theme>

</xml_diff>